<commit_message>
Updates for ADAP in winter 2025-26
</commit_message>
<xml_diff>
--- a/Lecture slides/ADAP A02 - Programming Setup.pptx
+++ b/Lecture slides/ADAP A02 - Programming Setup.pptx
@@ -704,7 +704,7 @@
   <p:cSld>
     <p:spTree>
       <p:nvGrpSpPr>
-        <p:cNvPr id="32" name="Shape 32"/>
+        <p:cNvPr id="47" name="Shape 47"/>
         <p:cNvGrpSpPr/>
         <p:nvPr/>
       </p:nvGrpSpPr>
@@ -718,7 +718,7 @@
       </p:grpSpPr>
       <p:sp>
         <p:nvSpPr>
-          <p:cNvPr id="33" name="Google Shape;33;p:notes"/>
+          <p:cNvPr id="48" name="Google Shape;48;p:notes"/>
           <p:cNvSpPr/>
           <p:nvPr>
             <p:ph idx="2" type="sldImg"/>
@@ -753,7 +753,7 @@
       </p:sp>
       <p:sp>
         <p:nvSpPr>
-          <p:cNvPr id="34" name="Google Shape;34;p:notes"/>
+          <p:cNvPr id="49" name="Google Shape;49;p:notes"/>
           <p:cNvSpPr txBox="1"/>
           <p:nvPr>
             <p:ph idx="1" type="body"/>
@@ -803,7 +803,7 @@
   <p:cSld>
     <p:spTree>
       <p:nvGrpSpPr>
-        <p:cNvPr id="95" name="Shape 95"/>
+        <p:cNvPr id="110" name="Shape 110"/>
         <p:cNvGrpSpPr/>
         <p:nvPr/>
       </p:nvGrpSpPr>
@@ -817,7 +817,7 @@
       </p:grpSpPr>
       <p:sp>
         <p:nvSpPr>
-          <p:cNvPr id="96" name="Google Shape;96;g30ceb50a694_0_0:notes"/>
+          <p:cNvPr id="111" name="Google Shape;111;g30ceb50a694_0_0:notes"/>
           <p:cNvSpPr/>
           <p:nvPr>
             <p:ph idx="2" type="sldImg"/>
@@ -852,7 +852,7 @@
       </p:sp>
       <p:sp>
         <p:nvSpPr>
-          <p:cNvPr id="97" name="Google Shape;97;g30ceb50a694_0_0:notes"/>
+          <p:cNvPr id="112" name="Google Shape;112;g30ceb50a694_0_0:notes"/>
           <p:cNvSpPr txBox="1"/>
           <p:nvPr>
             <p:ph idx="1" type="body"/>
@@ -902,7 +902,7 @@
   <p:cSld>
     <p:spTree>
       <p:nvGrpSpPr>
-        <p:cNvPr id="102" name="Shape 102"/>
+        <p:cNvPr id="117" name="Shape 117"/>
         <p:cNvGrpSpPr/>
         <p:nvPr/>
       </p:nvGrpSpPr>
@@ -916,7 +916,7 @@
       </p:grpSpPr>
       <p:sp>
         <p:nvSpPr>
-          <p:cNvPr id="103" name="Google Shape;103;g302639a1d31_0_9:notes"/>
+          <p:cNvPr id="118" name="Google Shape;118;g302639a1d31_0_9:notes"/>
           <p:cNvSpPr/>
           <p:nvPr>
             <p:ph idx="2" type="sldImg"/>
@@ -951,7 +951,7 @@
       </p:sp>
       <p:sp>
         <p:nvSpPr>
-          <p:cNvPr id="104" name="Google Shape;104;g302639a1d31_0_9:notes"/>
+          <p:cNvPr id="119" name="Google Shape;119;g302639a1d31_0_9:notes"/>
           <p:cNvSpPr txBox="1"/>
           <p:nvPr>
             <p:ph idx="1" type="body"/>
@@ -1001,7 +1001,7 @@
   <p:cSld>
     <p:spTree>
       <p:nvGrpSpPr>
-        <p:cNvPr id="109" name="Shape 109"/>
+        <p:cNvPr id="124" name="Shape 124"/>
         <p:cNvGrpSpPr/>
         <p:nvPr/>
       </p:nvGrpSpPr>
@@ -1015,7 +1015,7 @@
       </p:grpSpPr>
       <p:sp>
         <p:nvSpPr>
-          <p:cNvPr id="110" name="Google Shape;110;g2fe02fb2832_0_0:notes"/>
+          <p:cNvPr id="125" name="Google Shape;125;g2fe02fb2832_0_0:notes"/>
           <p:cNvSpPr/>
           <p:nvPr>
             <p:ph idx="2" type="sldImg"/>
@@ -1050,7 +1050,7 @@
       </p:sp>
       <p:sp>
         <p:nvSpPr>
-          <p:cNvPr id="111" name="Google Shape;111;g2fe02fb2832_0_0:notes"/>
+          <p:cNvPr id="126" name="Google Shape;126;g2fe02fb2832_0_0:notes"/>
           <p:cNvSpPr txBox="1"/>
           <p:nvPr>
             <p:ph idx="1" type="body"/>
@@ -1100,7 +1100,7 @@
   <p:cSld>
     <p:spTree>
       <p:nvGrpSpPr>
-        <p:cNvPr id="116" name="Shape 116"/>
+        <p:cNvPr id="131" name="Shape 131"/>
         <p:cNvGrpSpPr/>
         <p:nvPr/>
       </p:nvGrpSpPr>
@@ -1114,7 +1114,7 @@
       </p:grpSpPr>
       <p:sp>
         <p:nvSpPr>
-          <p:cNvPr id="117" name="Google Shape;117;g239609b2c0c_0_42:notes"/>
+          <p:cNvPr id="132" name="Google Shape;132;g239609b2c0c_0_42:notes"/>
           <p:cNvSpPr/>
           <p:nvPr>
             <p:ph idx="2" type="sldImg"/>
@@ -1149,7 +1149,7 @@
       </p:sp>
       <p:sp>
         <p:nvSpPr>
-          <p:cNvPr id="118" name="Google Shape;118;g239609b2c0c_0_42:notes"/>
+          <p:cNvPr id="133" name="Google Shape;133;g239609b2c0c_0_42:notes"/>
           <p:cNvSpPr txBox="1"/>
           <p:nvPr>
             <p:ph idx="1" type="body"/>
@@ -1199,7 +1199,7 @@
   <p:cSld>
     <p:spTree>
       <p:nvGrpSpPr>
-        <p:cNvPr id="122" name="Shape 122"/>
+        <p:cNvPr id="137" name="Shape 137"/>
         <p:cNvGrpSpPr/>
         <p:nvPr/>
       </p:nvGrpSpPr>
@@ -1213,7 +1213,7 @@
       </p:grpSpPr>
       <p:sp>
         <p:nvSpPr>
-          <p:cNvPr id="123" name="Google Shape;123;g239609b2c0c_0_47:notes"/>
+          <p:cNvPr id="138" name="Google Shape;138;g239609b2c0c_0_47:notes"/>
           <p:cNvSpPr/>
           <p:nvPr>
             <p:ph idx="2" type="sldImg"/>
@@ -1248,7 +1248,7 @@
       </p:sp>
       <p:sp>
         <p:nvSpPr>
-          <p:cNvPr id="124" name="Google Shape;124;g239609b2c0c_0_47:notes"/>
+          <p:cNvPr id="139" name="Google Shape;139;g239609b2c0c_0_47:notes"/>
           <p:cNvSpPr txBox="1"/>
           <p:nvPr>
             <p:ph idx="1" type="body"/>
@@ -1298,7 +1298,7 @@
   <p:cSld>
     <p:spTree>
       <p:nvGrpSpPr>
-        <p:cNvPr id="38" name="Shape 38"/>
+        <p:cNvPr id="53" name="Shape 53"/>
         <p:cNvGrpSpPr/>
         <p:nvPr/>
       </p:nvGrpSpPr>
@@ -1312,7 +1312,7 @@
       </p:grpSpPr>
       <p:sp>
         <p:nvSpPr>
-          <p:cNvPr id="39" name="Google Shape;39;g2fe02fb2832_0_6:notes"/>
+          <p:cNvPr id="54" name="Google Shape;54;g2fe02fb2832_0_6:notes"/>
           <p:cNvSpPr/>
           <p:nvPr>
             <p:ph idx="2" type="sldImg"/>
@@ -1347,7 +1347,7 @@
       </p:sp>
       <p:sp>
         <p:nvSpPr>
-          <p:cNvPr id="40" name="Google Shape;40;g2fe02fb2832_0_6:notes"/>
+          <p:cNvPr id="55" name="Google Shape;55;g2fe02fb2832_0_6:notes"/>
           <p:cNvSpPr txBox="1"/>
           <p:nvPr>
             <p:ph idx="1" type="body"/>
@@ -1397,7 +1397,7 @@
   <p:cSld>
     <p:spTree>
       <p:nvGrpSpPr>
-        <p:cNvPr id="45" name="Shape 45"/>
+        <p:cNvPr id="60" name="Shape 60"/>
         <p:cNvGrpSpPr/>
         <p:nvPr/>
       </p:nvGrpSpPr>
@@ -1411,7 +1411,7 @@
       </p:grpSpPr>
       <p:sp>
         <p:nvSpPr>
-          <p:cNvPr id="46" name="Google Shape;46;g302639a1d31_0_1:notes"/>
+          <p:cNvPr id="61" name="Google Shape;61;g302639a1d31_0_1:notes"/>
           <p:cNvSpPr/>
           <p:nvPr>
             <p:ph idx="2" type="sldImg"/>
@@ -1446,7 +1446,7 @@
       </p:sp>
       <p:sp>
         <p:nvSpPr>
-          <p:cNvPr id="47" name="Google Shape;47;g302639a1d31_0_1:notes"/>
+          <p:cNvPr id="62" name="Google Shape;62;g302639a1d31_0_1:notes"/>
           <p:cNvSpPr txBox="1"/>
           <p:nvPr>
             <p:ph idx="1" type="body"/>
@@ -1496,7 +1496,7 @@
   <p:cSld>
     <p:spTree>
       <p:nvGrpSpPr>
-        <p:cNvPr id="52" name="Shape 52"/>
+        <p:cNvPr id="67" name="Shape 67"/>
         <p:cNvGrpSpPr/>
         <p:nvPr/>
       </p:nvGrpSpPr>
@@ -1510,7 +1510,7 @@
       </p:grpSpPr>
       <p:sp>
         <p:nvSpPr>
-          <p:cNvPr id="53" name="Google Shape;53;g2d40ed7cc29_1_0:notes"/>
+          <p:cNvPr id="68" name="Google Shape;68;g2d40ed7cc29_1_0:notes"/>
           <p:cNvSpPr/>
           <p:nvPr>
             <p:ph idx="2" type="sldImg"/>
@@ -1545,7 +1545,7 @@
       </p:sp>
       <p:sp>
         <p:nvSpPr>
-          <p:cNvPr id="54" name="Google Shape;54;g2d40ed7cc29_1_0:notes"/>
+          <p:cNvPr id="69" name="Google Shape;69;g2d40ed7cc29_1_0:notes"/>
           <p:cNvSpPr txBox="1"/>
           <p:nvPr>
             <p:ph idx="1" type="body"/>
@@ -1595,7 +1595,7 @@
   <p:cSld>
     <p:spTree>
       <p:nvGrpSpPr>
-        <p:cNvPr id="60" name="Shape 60"/>
+        <p:cNvPr id="75" name="Shape 75"/>
         <p:cNvGrpSpPr/>
         <p:nvPr/>
       </p:nvGrpSpPr>
@@ -1609,7 +1609,7 @@
       </p:grpSpPr>
       <p:sp>
         <p:nvSpPr>
-          <p:cNvPr id="61" name="Google Shape;61;g3024184a3bf_0_0:notes"/>
+          <p:cNvPr id="76" name="Google Shape;76;g3024184a3bf_0_0:notes"/>
           <p:cNvSpPr/>
           <p:nvPr>
             <p:ph idx="2" type="sldImg"/>
@@ -1644,7 +1644,7 @@
       </p:sp>
       <p:sp>
         <p:nvSpPr>
-          <p:cNvPr id="62" name="Google Shape;62;g3024184a3bf_0_0:notes"/>
+          <p:cNvPr id="77" name="Google Shape;77;g3024184a3bf_0_0:notes"/>
           <p:cNvSpPr txBox="1"/>
           <p:nvPr>
             <p:ph idx="1" type="body"/>
@@ -1694,7 +1694,7 @@
   <p:cSld>
     <p:spTree>
       <p:nvGrpSpPr>
-        <p:cNvPr id="67" name="Shape 67"/>
+        <p:cNvPr id="82" name="Shape 82"/>
         <p:cNvGrpSpPr/>
         <p:nvPr/>
       </p:nvGrpSpPr>
@@ -1708,7 +1708,7 @@
       </p:grpSpPr>
       <p:sp>
         <p:nvSpPr>
-          <p:cNvPr id="68" name="Google Shape;68;g3024184a3bf_0_7:notes"/>
+          <p:cNvPr id="83" name="Google Shape;83;g3024184a3bf_0_7:notes"/>
           <p:cNvSpPr/>
           <p:nvPr>
             <p:ph idx="2" type="sldImg"/>
@@ -1743,7 +1743,7 @@
       </p:sp>
       <p:sp>
         <p:nvSpPr>
-          <p:cNvPr id="69" name="Google Shape;69;g3024184a3bf_0_7:notes"/>
+          <p:cNvPr id="84" name="Google Shape;84;g3024184a3bf_0_7:notes"/>
           <p:cNvSpPr txBox="1"/>
           <p:nvPr>
             <p:ph idx="1" type="body"/>
@@ -1793,7 +1793,7 @@
   <p:cSld>
     <p:spTree>
       <p:nvGrpSpPr>
-        <p:cNvPr id="74" name="Shape 74"/>
+        <p:cNvPr id="89" name="Shape 89"/>
         <p:cNvGrpSpPr/>
         <p:nvPr/>
       </p:nvGrpSpPr>
@@ -1807,7 +1807,7 @@
       </p:grpSpPr>
       <p:sp>
         <p:nvSpPr>
-          <p:cNvPr id="75" name="Google Shape;75;g3024184a3bf_0_20:notes"/>
+          <p:cNvPr id="90" name="Google Shape;90;g3024184a3bf_0_28:notes"/>
           <p:cNvSpPr/>
           <p:nvPr>
             <p:ph idx="2" type="sldImg"/>
@@ -1842,7 +1842,7 @@
       </p:sp>
       <p:sp>
         <p:nvSpPr>
-          <p:cNvPr id="76" name="Google Shape;76;g3024184a3bf_0_20:notes"/>
+          <p:cNvPr id="91" name="Google Shape;91;g3024184a3bf_0_28:notes"/>
           <p:cNvSpPr txBox="1"/>
           <p:nvPr>
             <p:ph idx="1" type="body"/>
@@ -1892,7 +1892,7 @@
   <p:cSld>
     <p:spTree>
       <p:nvGrpSpPr>
-        <p:cNvPr id="81" name="Shape 81"/>
+        <p:cNvPr id="96" name="Shape 96"/>
         <p:cNvGrpSpPr/>
         <p:nvPr/>
       </p:nvGrpSpPr>
@@ -1906,7 +1906,7 @@
       </p:grpSpPr>
       <p:sp>
         <p:nvSpPr>
-          <p:cNvPr id="82" name="Google Shape;82;g3024184a3bf_0_28:notes"/>
+          <p:cNvPr id="97" name="Google Shape;97;g3024184a3bf_0_20:notes"/>
           <p:cNvSpPr/>
           <p:nvPr>
             <p:ph idx="2" type="sldImg"/>
@@ -1941,7 +1941,7 @@
       </p:sp>
       <p:sp>
         <p:nvSpPr>
-          <p:cNvPr id="83" name="Google Shape;83;g3024184a3bf_0_28:notes"/>
+          <p:cNvPr id="98" name="Google Shape;98;g3024184a3bf_0_20:notes"/>
           <p:cNvSpPr txBox="1"/>
           <p:nvPr>
             <p:ph idx="1" type="body"/>
@@ -1991,7 +1991,7 @@
   <p:cSld>
     <p:spTree>
       <p:nvGrpSpPr>
-        <p:cNvPr id="88" name="Shape 88"/>
+        <p:cNvPr id="103" name="Shape 103"/>
         <p:cNvGrpSpPr/>
         <p:nvPr/>
       </p:nvGrpSpPr>
@@ -2005,7 +2005,7 @@
       </p:grpSpPr>
       <p:sp>
         <p:nvSpPr>
-          <p:cNvPr id="89" name="Google Shape;89;g3024184a3bf_0_13:notes"/>
+          <p:cNvPr id="104" name="Google Shape;104;g3024184a3bf_0_13:notes"/>
           <p:cNvSpPr/>
           <p:nvPr>
             <p:ph idx="2" type="sldImg"/>
@@ -2040,7 +2040,7 @@
       </p:sp>
       <p:sp>
         <p:nvSpPr>
-          <p:cNvPr id="90" name="Google Shape;90;g3024184a3bf_0_13:notes"/>
+          <p:cNvPr id="105" name="Google Shape;105;g3024184a3bf_0_13:notes"/>
           <p:cNvSpPr txBox="1"/>
           <p:nvPr>
             <p:ph idx="1" type="body"/>
@@ -2387,49 +2387,150 @@
           <a:p/>
         </p:txBody>
       </p:sp>
-      <p:sp>
-        <p:nvSpPr>
+      <p:grpSp>
+        <p:nvGrpSpPr>
           <p:cNvPr id="12" name="Google Shape;12;p2"/>
-          <p:cNvSpPr/>
+          <p:cNvGrpSpPr/>
           <p:nvPr/>
-        </p:nvSpPr>
-        <p:spPr>
+        </p:nvGrpSpPr>
+        <p:grpSpPr>
           <a:xfrm>
             <a:off x="0" y="2388810"/>
             <a:ext cx="9144000" cy="183000"/>
+            <a:chOff x="0" y="2388810"/>
+            <a:chExt cx="9144000" cy="183000"/>
           </a:xfrm>
-          <a:prstGeom prst="rect">
-            <a:avLst/>
-          </a:prstGeom>
-          <a:solidFill>
-            <a:schemeClr val="accent4"/>
-          </a:solidFill>
-          <a:ln>
-            <a:noFill/>
-          </a:ln>
-        </p:spPr>
-        <p:txBody>
-          <a:bodyPr anchorCtr="0" anchor="ctr" bIns="91425" lIns="91425" spcFirstLastPara="1" rIns="91425" wrap="square" tIns="91425">
-            <a:noAutofit/>
-          </a:bodyPr>
-          <a:lstStyle/>
-          <a:p>
-            <a:pPr indent="0" lvl="0" marL="0" rtl="0" algn="l">
-              <a:spcBef>
-                <a:spcPts val="0"/>
-              </a:spcBef>
-              <a:spcAft>
-                <a:spcPts val="0"/>
-              </a:spcAft>
-              <a:buNone/>
-            </a:pPr>
-            <a:r>
-              <a:t/>
-            </a:r>
-            <a:endParaRPr/>
-          </a:p>
-        </p:txBody>
-      </p:sp>
+        </p:grpSpPr>
+        <p:sp>
+          <p:nvSpPr>
+            <p:cNvPr id="13" name="Google Shape;13;p2"/>
+            <p:cNvSpPr/>
+            <p:nvPr/>
+          </p:nvSpPr>
+          <p:spPr>
+            <a:xfrm>
+              <a:off x="0" y="2388810"/>
+              <a:ext cx="914400" cy="183000"/>
+            </a:xfrm>
+            <a:prstGeom prst="rect">
+              <a:avLst/>
+            </a:prstGeom>
+            <a:solidFill>
+              <a:schemeClr val="accent2"/>
+            </a:solidFill>
+            <a:ln>
+              <a:noFill/>
+            </a:ln>
+          </p:spPr>
+          <p:txBody>
+            <a:bodyPr anchorCtr="0" anchor="ctr" bIns="91425" lIns="91425" spcFirstLastPara="1" rIns="91425" wrap="square" tIns="91425">
+              <a:noAutofit/>
+            </a:bodyPr>
+            <a:lstStyle/>
+            <a:p>
+              <a:pPr indent="0" lvl="0" marL="0" rtl="0" algn="l">
+                <a:spcBef>
+                  <a:spcPts val="0"/>
+                </a:spcBef>
+                <a:spcAft>
+                  <a:spcPts val="0"/>
+                </a:spcAft>
+                <a:buNone/>
+              </a:pPr>
+              <a:r>
+                <a:t/>
+              </a:r>
+              <a:endParaRPr/>
+            </a:p>
+          </p:txBody>
+        </p:sp>
+        <p:sp>
+          <p:nvSpPr>
+            <p:cNvPr id="14" name="Google Shape;14;p2"/>
+            <p:cNvSpPr/>
+            <p:nvPr/>
+          </p:nvSpPr>
+          <p:spPr>
+            <a:xfrm>
+              <a:off x="914400" y="2388810"/>
+              <a:ext cx="1828800" cy="183000"/>
+            </a:xfrm>
+            <a:prstGeom prst="rect">
+              <a:avLst/>
+            </a:prstGeom>
+            <a:solidFill>
+              <a:schemeClr val="accent3"/>
+            </a:solidFill>
+            <a:ln>
+              <a:noFill/>
+            </a:ln>
+          </p:spPr>
+          <p:txBody>
+            <a:bodyPr anchorCtr="0" anchor="ctr" bIns="91425" lIns="91425" spcFirstLastPara="1" rIns="91425" wrap="square" tIns="91425">
+              <a:noAutofit/>
+            </a:bodyPr>
+            <a:lstStyle/>
+            <a:p>
+              <a:pPr indent="0" lvl="0" marL="0" rtl="0" algn="l">
+                <a:spcBef>
+                  <a:spcPts val="0"/>
+                </a:spcBef>
+                <a:spcAft>
+                  <a:spcPts val="0"/>
+                </a:spcAft>
+                <a:buNone/>
+              </a:pPr>
+              <a:r>
+                <a:t/>
+              </a:r>
+              <a:endParaRPr/>
+            </a:p>
+          </p:txBody>
+        </p:sp>
+        <p:sp>
+          <p:nvSpPr>
+            <p:cNvPr id="15" name="Google Shape;15;p2"/>
+            <p:cNvSpPr/>
+            <p:nvPr/>
+          </p:nvSpPr>
+          <p:spPr>
+            <a:xfrm>
+              <a:off x="2743200" y="2388810"/>
+              <a:ext cx="6400800" cy="183000"/>
+            </a:xfrm>
+            <a:prstGeom prst="rect">
+              <a:avLst/>
+            </a:prstGeom>
+            <a:solidFill>
+              <a:schemeClr val="accent4"/>
+            </a:solidFill>
+            <a:ln>
+              <a:noFill/>
+            </a:ln>
+          </p:spPr>
+          <p:txBody>
+            <a:bodyPr anchorCtr="0" anchor="ctr" bIns="91425" lIns="91425" spcFirstLastPara="1" rIns="91425" wrap="square" tIns="91425">
+              <a:noAutofit/>
+            </a:bodyPr>
+            <a:lstStyle/>
+            <a:p>
+              <a:pPr indent="0" lvl="0" marL="0" rtl="0" algn="l">
+                <a:spcBef>
+                  <a:spcPts val="0"/>
+                </a:spcBef>
+                <a:spcAft>
+                  <a:spcPts val="0"/>
+                </a:spcAft>
+                <a:buNone/>
+              </a:pPr>
+              <a:r>
+                <a:t/>
+              </a:r>
+              <a:endParaRPr/>
+            </a:p>
+          </p:txBody>
+        </p:sp>
+      </p:grpSp>
     </p:spTree>
   </p:cSld>
   <p:clrMapOvr>
@@ -2443,7 +2544,7 @@
   <p:cSld name="SECTION_HEADER">
     <p:spTree>
       <p:nvGrpSpPr>
-        <p:cNvPr id="13" name="Shape 13"/>
+        <p:cNvPr id="16" name="Shape 16"/>
         <p:cNvGrpSpPr/>
         <p:nvPr/>
       </p:nvGrpSpPr>
@@ -2457,7 +2558,7 @@
       </p:grpSpPr>
       <p:sp>
         <p:nvSpPr>
-          <p:cNvPr id="14" name="Google Shape;14;p3"/>
+          <p:cNvPr id="17" name="Google Shape;17;p3"/>
           <p:cNvSpPr txBox="1"/>
           <p:nvPr>
             <p:ph type="title"/>
@@ -2580,49 +2681,150 @@
           <a:p/>
         </p:txBody>
       </p:sp>
-      <p:sp>
-        <p:nvSpPr>
-          <p:cNvPr id="15" name="Google Shape;15;p3"/>
-          <p:cNvSpPr/>
+      <p:grpSp>
+        <p:nvGrpSpPr>
+          <p:cNvPr id="18" name="Google Shape;18;p3"/>
+          <p:cNvGrpSpPr/>
           <p:nvPr/>
-        </p:nvSpPr>
-        <p:spPr>
+        </p:nvGrpSpPr>
+        <p:grpSpPr>
           <a:xfrm>
-            <a:off x="0" y="2386584"/>
+            <a:off x="0" y="2432304"/>
             <a:ext cx="9144000" cy="91500"/>
+            <a:chOff x="0" y="2386584"/>
+            <a:chExt cx="9144000" cy="91500"/>
           </a:xfrm>
-          <a:prstGeom prst="rect">
-            <a:avLst/>
-          </a:prstGeom>
-          <a:solidFill>
-            <a:schemeClr val="accent4"/>
-          </a:solidFill>
-          <a:ln>
-            <a:noFill/>
-          </a:ln>
-        </p:spPr>
-        <p:txBody>
-          <a:bodyPr anchorCtr="0" anchor="ctr" bIns="91425" lIns="91425" spcFirstLastPara="1" rIns="91425" wrap="square" tIns="91425">
-            <a:noAutofit/>
-          </a:bodyPr>
-          <a:lstStyle/>
-          <a:p>
-            <a:pPr indent="0" lvl="0" marL="0" rtl="0" algn="l">
-              <a:spcBef>
-                <a:spcPts val="0"/>
-              </a:spcBef>
-              <a:spcAft>
-                <a:spcPts val="0"/>
-              </a:spcAft>
-              <a:buNone/>
-            </a:pPr>
-            <a:r>
-              <a:t/>
-            </a:r>
-            <a:endParaRPr/>
-          </a:p>
-        </p:txBody>
-      </p:sp>
+        </p:grpSpPr>
+        <p:sp>
+          <p:nvSpPr>
+            <p:cNvPr id="19" name="Google Shape;19;p3"/>
+            <p:cNvSpPr/>
+            <p:nvPr/>
+          </p:nvSpPr>
+          <p:spPr>
+            <a:xfrm>
+              <a:off x="0" y="2386584"/>
+              <a:ext cx="914400" cy="91500"/>
+            </a:xfrm>
+            <a:prstGeom prst="rect">
+              <a:avLst/>
+            </a:prstGeom>
+            <a:solidFill>
+              <a:schemeClr val="accent2"/>
+            </a:solidFill>
+            <a:ln>
+              <a:noFill/>
+            </a:ln>
+          </p:spPr>
+          <p:txBody>
+            <a:bodyPr anchorCtr="0" anchor="ctr" bIns="91425" lIns="91425" spcFirstLastPara="1" rIns="91425" wrap="square" tIns="91425">
+              <a:noAutofit/>
+            </a:bodyPr>
+            <a:lstStyle/>
+            <a:p>
+              <a:pPr indent="0" lvl="0" marL="0" rtl="0" algn="l">
+                <a:spcBef>
+                  <a:spcPts val="0"/>
+                </a:spcBef>
+                <a:spcAft>
+                  <a:spcPts val="0"/>
+                </a:spcAft>
+                <a:buNone/>
+              </a:pPr>
+              <a:r>
+                <a:t/>
+              </a:r>
+              <a:endParaRPr/>
+            </a:p>
+          </p:txBody>
+        </p:sp>
+        <p:sp>
+          <p:nvSpPr>
+            <p:cNvPr id="20" name="Google Shape;20;p3"/>
+            <p:cNvSpPr/>
+            <p:nvPr/>
+          </p:nvSpPr>
+          <p:spPr>
+            <a:xfrm>
+              <a:off x="914400" y="2386584"/>
+              <a:ext cx="1828800" cy="91500"/>
+            </a:xfrm>
+            <a:prstGeom prst="rect">
+              <a:avLst/>
+            </a:prstGeom>
+            <a:solidFill>
+              <a:schemeClr val="accent3"/>
+            </a:solidFill>
+            <a:ln>
+              <a:noFill/>
+            </a:ln>
+          </p:spPr>
+          <p:txBody>
+            <a:bodyPr anchorCtr="0" anchor="ctr" bIns="91425" lIns="91425" spcFirstLastPara="1" rIns="91425" wrap="square" tIns="91425">
+              <a:noAutofit/>
+            </a:bodyPr>
+            <a:lstStyle/>
+            <a:p>
+              <a:pPr indent="0" lvl="0" marL="0" rtl="0" algn="l">
+                <a:spcBef>
+                  <a:spcPts val="0"/>
+                </a:spcBef>
+                <a:spcAft>
+                  <a:spcPts val="0"/>
+                </a:spcAft>
+                <a:buNone/>
+              </a:pPr>
+              <a:r>
+                <a:t/>
+              </a:r>
+              <a:endParaRPr/>
+            </a:p>
+          </p:txBody>
+        </p:sp>
+        <p:sp>
+          <p:nvSpPr>
+            <p:cNvPr id="21" name="Google Shape;21;p3"/>
+            <p:cNvSpPr/>
+            <p:nvPr/>
+          </p:nvSpPr>
+          <p:spPr>
+            <a:xfrm>
+              <a:off x="2743200" y="2386584"/>
+              <a:ext cx="6400800" cy="91500"/>
+            </a:xfrm>
+            <a:prstGeom prst="rect">
+              <a:avLst/>
+            </a:prstGeom>
+            <a:solidFill>
+              <a:schemeClr val="accent4"/>
+            </a:solidFill>
+            <a:ln>
+              <a:noFill/>
+            </a:ln>
+          </p:spPr>
+          <p:txBody>
+            <a:bodyPr anchorCtr="0" anchor="ctr" bIns="91425" lIns="91425" spcFirstLastPara="1" rIns="91425" wrap="square" tIns="91425">
+              <a:noAutofit/>
+            </a:bodyPr>
+            <a:lstStyle/>
+            <a:p>
+              <a:pPr indent="0" lvl="0" marL="0" rtl="0" algn="l">
+                <a:spcBef>
+                  <a:spcPts val="0"/>
+                </a:spcBef>
+                <a:spcAft>
+                  <a:spcPts val="0"/>
+                </a:spcAft>
+                <a:buNone/>
+              </a:pPr>
+              <a:r>
+                <a:t/>
+              </a:r>
+              <a:endParaRPr/>
+            </a:p>
+          </p:txBody>
+        </p:sp>
+      </p:grpSp>
     </p:spTree>
   </p:cSld>
   <p:clrMapOvr>
@@ -2636,7 +2838,7 @@
   <p:cSld name="TITLE_AND_BODY">
     <p:spTree>
       <p:nvGrpSpPr>
-        <p:cNvPr id="16" name="Shape 16"/>
+        <p:cNvPr id="22" name="Shape 22"/>
         <p:cNvGrpSpPr/>
         <p:nvPr/>
       </p:nvGrpSpPr>
@@ -2650,7 +2852,7 @@
       </p:grpSpPr>
       <p:sp>
         <p:nvSpPr>
-          <p:cNvPr id="17" name="Google Shape;17;p4"/>
+          <p:cNvPr id="23" name="Google Shape;23;p4"/>
           <p:cNvSpPr txBox="1"/>
           <p:nvPr>
             <p:ph type="title"/>
@@ -2775,7 +2977,7 @@
       </p:sp>
       <p:sp>
         <p:nvSpPr>
-          <p:cNvPr id="18" name="Google Shape;18;p4"/>
+          <p:cNvPr id="24" name="Google Shape;24;p4"/>
           <p:cNvSpPr txBox="1"/>
           <p:nvPr>
             <p:ph idx="1" type="body"/>
@@ -2900,50 +3102,7 @@
       </p:sp>
       <p:sp>
         <p:nvSpPr>
-          <p:cNvPr id="19" name="Google Shape;19;p4"/>
-          <p:cNvSpPr/>
-          <p:nvPr/>
-        </p:nvSpPr>
-        <p:spPr>
-          <a:xfrm>
-            <a:off x="0" y="685800"/>
-            <a:ext cx="9144000" cy="91500"/>
-          </a:xfrm>
-          <a:prstGeom prst="rect">
-            <a:avLst/>
-          </a:prstGeom>
-          <a:solidFill>
-            <a:schemeClr val="accent4"/>
-          </a:solidFill>
-          <a:ln>
-            <a:noFill/>
-          </a:ln>
-        </p:spPr>
-        <p:txBody>
-          <a:bodyPr anchorCtr="0" anchor="ctr" bIns="91425" lIns="91425" spcFirstLastPara="1" rIns="91425" wrap="square" tIns="91425">
-            <a:noAutofit/>
-          </a:bodyPr>
-          <a:lstStyle/>
-          <a:p>
-            <a:pPr indent="0" lvl="0" marL="0" rtl="0" algn="l">
-              <a:spcBef>
-                <a:spcPts val="0"/>
-              </a:spcBef>
-              <a:spcAft>
-                <a:spcPts val="0"/>
-              </a:spcAft>
-              <a:buNone/>
-            </a:pPr>
-            <a:r>
-              <a:t/>
-            </a:r>
-            <a:endParaRPr/>
-          </a:p>
-        </p:txBody>
-      </p:sp>
-      <p:sp>
-        <p:nvSpPr>
-          <p:cNvPr id="20" name="Google Shape;20;p4"/>
+          <p:cNvPr id="25" name="Google Shape;25;p4"/>
           <p:cNvSpPr txBox="1"/>
           <p:nvPr>
             <p:ph idx="12" type="sldNum"/>
@@ -2951,8 +3110,8 @@
         </p:nvSpPr>
         <p:spPr>
           <a:xfrm>
-            <a:off x="7315209" y="4229101"/>
-            <a:ext cx="1828800" cy="914400"/>
+            <a:off x="7315202" y="4416550"/>
+            <a:ext cx="1828800" cy="731400"/>
           </a:xfrm>
           <a:prstGeom prst="rect">
             <a:avLst/>
@@ -2963,73 +3122,73 @@
             <a:noAutofit/>
           </a:bodyPr>
           <a:lstStyle>
-            <a:lvl1pPr lvl="0" rtl="0" algn="r">
-              <a:buNone/>
-              <a:defRPr b="1" sz="2400">
+            <a:lvl1pPr lvl="0" rtl="0">
+              <a:buNone/>
+              <a:defRPr>
                 <a:solidFill>
                   <a:schemeClr val="dk1"/>
                 </a:solidFill>
               </a:defRPr>
             </a:lvl1pPr>
-            <a:lvl2pPr lvl="1" rtl="0" algn="r">
-              <a:buNone/>
-              <a:defRPr b="1" sz="2400">
+            <a:lvl2pPr lvl="1" rtl="0">
+              <a:buNone/>
+              <a:defRPr>
                 <a:solidFill>
                   <a:schemeClr val="dk1"/>
                 </a:solidFill>
               </a:defRPr>
             </a:lvl2pPr>
-            <a:lvl3pPr lvl="2" rtl="0" algn="r">
-              <a:buNone/>
-              <a:defRPr b="1" sz="2400">
+            <a:lvl3pPr lvl="2" rtl="0">
+              <a:buNone/>
+              <a:defRPr>
                 <a:solidFill>
                   <a:schemeClr val="dk1"/>
                 </a:solidFill>
               </a:defRPr>
             </a:lvl3pPr>
-            <a:lvl4pPr lvl="3" rtl="0" algn="r">
-              <a:buNone/>
-              <a:defRPr b="1" sz="2400">
+            <a:lvl4pPr lvl="3" rtl="0">
+              <a:buNone/>
+              <a:defRPr>
                 <a:solidFill>
                   <a:schemeClr val="dk1"/>
                 </a:solidFill>
               </a:defRPr>
             </a:lvl4pPr>
-            <a:lvl5pPr lvl="4" rtl="0" algn="r">
-              <a:buNone/>
-              <a:defRPr b="1" sz="2400">
+            <a:lvl5pPr lvl="4" rtl="0">
+              <a:buNone/>
+              <a:defRPr>
                 <a:solidFill>
                   <a:schemeClr val="dk1"/>
                 </a:solidFill>
               </a:defRPr>
             </a:lvl5pPr>
-            <a:lvl6pPr lvl="5" rtl="0" algn="r">
-              <a:buNone/>
-              <a:defRPr b="1" sz="2400">
+            <a:lvl6pPr lvl="5" rtl="0">
+              <a:buNone/>
+              <a:defRPr>
                 <a:solidFill>
                   <a:schemeClr val="dk1"/>
                 </a:solidFill>
               </a:defRPr>
             </a:lvl6pPr>
-            <a:lvl7pPr lvl="6" rtl="0" algn="r">
-              <a:buNone/>
-              <a:defRPr b="1" sz="2400">
+            <a:lvl7pPr lvl="6" rtl="0">
+              <a:buNone/>
+              <a:defRPr>
                 <a:solidFill>
                   <a:schemeClr val="dk1"/>
                 </a:solidFill>
               </a:defRPr>
             </a:lvl7pPr>
-            <a:lvl8pPr lvl="7" rtl="0" algn="r">
-              <a:buNone/>
-              <a:defRPr b="1" sz="2400">
+            <a:lvl8pPr lvl="7" rtl="0">
+              <a:buNone/>
+              <a:defRPr>
                 <a:solidFill>
                   <a:schemeClr val="dk1"/>
                 </a:solidFill>
               </a:defRPr>
             </a:lvl8pPr>
-            <a:lvl9pPr lvl="8" rtl="0" algn="r">
-              <a:buNone/>
-              <a:defRPr b="1" sz="2400">
+            <a:lvl9pPr lvl="8" rtl="0">
+              <a:buNone/>
+              <a:defRPr>
                 <a:solidFill>
                   <a:schemeClr val="dk1"/>
                 </a:solidFill>
@@ -3060,26 +3219,177 @@
               <a:spcAft>
                 <a:spcPts val="0"/>
               </a:spcAft>
-              <a:buClr>
-                <a:schemeClr val="dk1"/>
-              </a:buClr>
-              <a:buSzPts val="1100"/>
-              <a:buFont typeface="Arial"/>
-              <a:buNone/>
-            </a:pPr>
-            <a:r>
-              <a:rPr b="0" lang="en" sz="1000" u="sng">
+              <a:buNone/>
+            </a:pPr>
+            <a:r>
+              <a:rPr b="0" lang="en" sz="900" u="sng">
                 <a:solidFill>
                   <a:schemeClr val="hlink"/>
                 </a:solidFill>
                 <a:hlinkClick r:id="rId2"/>
               </a:rPr>
-              <a:t>https://profriehle.com</a:t>
-            </a:r>
-            <a:endParaRPr b="0" sz="1000"/>
+              <a:t>https://oss.cs.fau.de</a:t>
+            </a:r>
+            <a:r>
+              <a:rPr b="0" lang="en" sz="900">
+                <a:solidFill>
+                  <a:schemeClr val="dk2"/>
+                </a:solidFill>
+              </a:rPr>
+              <a:t> </a:t>
+            </a:r>
+            <a:endParaRPr b="0" sz="900">
+              <a:solidFill>
+                <a:schemeClr val="dk2"/>
+              </a:solidFill>
+            </a:endParaRPr>
           </a:p>
         </p:txBody>
       </p:sp>
+      <p:grpSp>
+        <p:nvGrpSpPr>
+          <p:cNvPr id="26" name="Google Shape;26;p4"/>
+          <p:cNvGrpSpPr/>
+          <p:nvPr/>
+        </p:nvGrpSpPr>
+        <p:grpSpPr>
+          <a:xfrm>
+            <a:off x="0" y="685800"/>
+            <a:ext cx="9144000" cy="91500"/>
+            <a:chOff x="0" y="2386584"/>
+            <a:chExt cx="9144000" cy="91500"/>
+          </a:xfrm>
+        </p:grpSpPr>
+        <p:sp>
+          <p:nvSpPr>
+            <p:cNvPr id="27" name="Google Shape;27;p4"/>
+            <p:cNvSpPr/>
+            <p:nvPr/>
+          </p:nvSpPr>
+          <p:spPr>
+            <a:xfrm>
+              <a:off x="0" y="2386584"/>
+              <a:ext cx="914400" cy="91500"/>
+            </a:xfrm>
+            <a:prstGeom prst="rect">
+              <a:avLst/>
+            </a:prstGeom>
+            <a:solidFill>
+              <a:schemeClr val="accent2"/>
+            </a:solidFill>
+            <a:ln>
+              <a:noFill/>
+            </a:ln>
+          </p:spPr>
+          <p:txBody>
+            <a:bodyPr anchorCtr="0" anchor="ctr" bIns="91425" lIns="91425" spcFirstLastPara="1" rIns="91425" wrap="square" tIns="91425">
+              <a:noAutofit/>
+            </a:bodyPr>
+            <a:lstStyle/>
+            <a:p>
+              <a:pPr indent="0" lvl="0" marL="0" rtl="0" algn="l">
+                <a:spcBef>
+                  <a:spcPts val="0"/>
+                </a:spcBef>
+                <a:spcAft>
+                  <a:spcPts val="0"/>
+                </a:spcAft>
+                <a:buNone/>
+              </a:pPr>
+              <a:r>
+                <a:t/>
+              </a:r>
+              <a:endParaRPr/>
+            </a:p>
+          </p:txBody>
+        </p:sp>
+        <p:sp>
+          <p:nvSpPr>
+            <p:cNvPr id="28" name="Google Shape;28;p4"/>
+            <p:cNvSpPr/>
+            <p:nvPr/>
+          </p:nvSpPr>
+          <p:spPr>
+            <a:xfrm>
+              <a:off x="914400" y="2386584"/>
+              <a:ext cx="1828800" cy="91500"/>
+            </a:xfrm>
+            <a:prstGeom prst="rect">
+              <a:avLst/>
+            </a:prstGeom>
+            <a:solidFill>
+              <a:schemeClr val="accent3"/>
+            </a:solidFill>
+            <a:ln>
+              <a:noFill/>
+            </a:ln>
+          </p:spPr>
+          <p:txBody>
+            <a:bodyPr anchorCtr="0" anchor="ctr" bIns="91425" lIns="91425" spcFirstLastPara="1" rIns="91425" wrap="square" tIns="91425">
+              <a:noAutofit/>
+            </a:bodyPr>
+            <a:lstStyle/>
+            <a:p>
+              <a:pPr indent="0" lvl="0" marL="0" rtl="0" algn="l">
+                <a:spcBef>
+                  <a:spcPts val="0"/>
+                </a:spcBef>
+                <a:spcAft>
+                  <a:spcPts val="0"/>
+                </a:spcAft>
+                <a:buNone/>
+              </a:pPr>
+              <a:r>
+                <a:t/>
+              </a:r>
+              <a:endParaRPr/>
+            </a:p>
+          </p:txBody>
+        </p:sp>
+        <p:sp>
+          <p:nvSpPr>
+            <p:cNvPr id="29" name="Google Shape;29;p4"/>
+            <p:cNvSpPr/>
+            <p:nvPr/>
+          </p:nvSpPr>
+          <p:spPr>
+            <a:xfrm>
+              <a:off x="2743200" y="2386584"/>
+              <a:ext cx="6400800" cy="91500"/>
+            </a:xfrm>
+            <a:prstGeom prst="rect">
+              <a:avLst/>
+            </a:prstGeom>
+            <a:solidFill>
+              <a:schemeClr val="accent4"/>
+            </a:solidFill>
+            <a:ln>
+              <a:noFill/>
+            </a:ln>
+          </p:spPr>
+          <p:txBody>
+            <a:bodyPr anchorCtr="0" anchor="ctr" bIns="91425" lIns="91425" spcFirstLastPara="1" rIns="91425" wrap="square" tIns="91425">
+              <a:noAutofit/>
+            </a:bodyPr>
+            <a:lstStyle/>
+            <a:p>
+              <a:pPr indent="0" lvl="0" marL="0" rtl="0" algn="l">
+                <a:spcBef>
+                  <a:spcPts val="0"/>
+                </a:spcBef>
+                <a:spcAft>
+                  <a:spcPts val="0"/>
+                </a:spcAft>
+                <a:buNone/>
+              </a:pPr>
+              <a:r>
+                <a:t/>
+              </a:r>
+              <a:endParaRPr/>
+            </a:p>
+          </p:txBody>
+        </p:sp>
+      </p:grpSp>
     </p:spTree>
   </p:cSld>
   <p:clrMapOvr>
@@ -3093,7 +3403,7 @@
   <p:cSld name="TITLE_AND_TWO_COLUMNS">
     <p:spTree>
       <p:nvGrpSpPr>
-        <p:cNvPr id="21" name="Shape 21"/>
+        <p:cNvPr id="30" name="Shape 30"/>
         <p:cNvGrpSpPr/>
         <p:nvPr/>
       </p:nvGrpSpPr>
@@ -3107,7 +3417,7 @@
       </p:grpSpPr>
       <p:sp>
         <p:nvSpPr>
-          <p:cNvPr id="22" name="Google Shape;22;p5"/>
+          <p:cNvPr id="31" name="Google Shape;31;p5"/>
           <p:cNvSpPr txBox="1"/>
           <p:nvPr>
             <p:ph type="title"/>
@@ -3235,7 +3545,7 @@
       </p:sp>
       <p:sp>
         <p:nvSpPr>
-          <p:cNvPr id="23" name="Google Shape;23;p5"/>
+          <p:cNvPr id="32" name="Google Shape;32;p5"/>
           <p:cNvSpPr txBox="1"/>
           <p:nvPr>
             <p:ph idx="1" type="body"/>
@@ -3360,7 +3670,7 @@
       </p:sp>
       <p:sp>
         <p:nvSpPr>
-          <p:cNvPr id="24" name="Google Shape;24;p5"/>
+          <p:cNvPr id="33" name="Google Shape;33;p5"/>
           <p:cNvSpPr txBox="1"/>
           <p:nvPr>
             <p:ph idx="2" type="body"/>
@@ -3485,50 +3795,7 @@
       </p:sp>
       <p:sp>
         <p:nvSpPr>
-          <p:cNvPr id="25" name="Google Shape;25;p5"/>
-          <p:cNvSpPr/>
-          <p:nvPr/>
-        </p:nvSpPr>
-        <p:spPr>
-          <a:xfrm>
-            <a:off x="0" y="685800"/>
-            <a:ext cx="9144000" cy="91500"/>
-          </a:xfrm>
-          <a:prstGeom prst="rect">
-            <a:avLst/>
-          </a:prstGeom>
-          <a:solidFill>
-            <a:schemeClr val="accent4"/>
-          </a:solidFill>
-          <a:ln>
-            <a:noFill/>
-          </a:ln>
-        </p:spPr>
-        <p:txBody>
-          <a:bodyPr anchorCtr="0" anchor="ctr" bIns="91425" lIns="91425" spcFirstLastPara="1" rIns="91425" wrap="square" tIns="91425">
-            <a:noAutofit/>
-          </a:bodyPr>
-          <a:lstStyle/>
-          <a:p>
-            <a:pPr indent="0" lvl="0" marL="0" rtl="0" algn="l">
-              <a:spcBef>
-                <a:spcPts val="0"/>
-              </a:spcBef>
-              <a:spcAft>
-                <a:spcPts val="0"/>
-              </a:spcAft>
-              <a:buNone/>
-            </a:pPr>
-            <a:r>
-              <a:t/>
-            </a:r>
-            <a:endParaRPr/>
-          </a:p>
-        </p:txBody>
-      </p:sp>
-      <p:sp>
-        <p:nvSpPr>
-          <p:cNvPr id="26" name="Google Shape;26;p5"/>
+          <p:cNvPr id="34" name="Google Shape;34;p5"/>
           <p:cNvSpPr txBox="1"/>
           <p:nvPr>
             <p:ph idx="12" type="sldNum"/>
@@ -3536,8 +3803,8 @@
         </p:nvSpPr>
         <p:spPr>
           <a:xfrm>
-            <a:off x="7315209" y="4229101"/>
-            <a:ext cx="1828800" cy="914400"/>
+            <a:off x="7315202" y="4416550"/>
+            <a:ext cx="1828800" cy="731400"/>
           </a:xfrm>
           <a:prstGeom prst="rect">
             <a:avLst/>
@@ -3548,73 +3815,73 @@
             <a:noAutofit/>
           </a:bodyPr>
           <a:lstStyle>
-            <a:lvl1pPr lvl="0" rtl="0" algn="r">
-              <a:buNone/>
-              <a:defRPr b="1" sz="2400">
+            <a:lvl1pPr lvl="0">
+              <a:buNone/>
+              <a:defRPr>
                 <a:solidFill>
                   <a:schemeClr val="dk1"/>
                 </a:solidFill>
               </a:defRPr>
             </a:lvl1pPr>
-            <a:lvl2pPr lvl="1" rtl="0" algn="r">
-              <a:buNone/>
-              <a:defRPr b="1" sz="2400">
+            <a:lvl2pPr lvl="1">
+              <a:buNone/>
+              <a:defRPr>
                 <a:solidFill>
                   <a:schemeClr val="dk1"/>
                 </a:solidFill>
               </a:defRPr>
             </a:lvl2pPr>
-            <a:lvl3pPr lvl="2" rtl="0" algn="r">
-              <a:buNone/>
-              <a:defRPr b="1" sz="2400">
+            <a:lvl3pPr lvl="2">
+              <a:buNone/>
+              <a:defRPr>
                 <a:solidFill>
                   <a:schemeClr val="dk1"/>
                 </a:solidFill>
               </a:defRPr>
             </a:lvl3pPr>
-            <a:lvl4pPr lvl="3" rtl="0" algn="r">
-              <a:buNone/>
-              <a:defRPr b="1" sz="2400">
+            <a:lvl4pPr lvl="3">
+              <a:buNone/>
+              <a:defRPr>
                 <a:solidFill>
                   <a:schemeClr val="dk1"/>
                 </a:solidFill>
               </a:defRPr>
             </a:lvl4pPr>
-            <a:lvl5pPr lvl="4" rtl="0" algn="r">
-              <a:buNone/>
-              <a:defRPr b="1" sz="2400">
+            <a:lvl5pPr lvl="4">
+              <a:buNone/>
+              <a:defRPr>
                 <a:solidFill>
                   <a:schemeClr val="dk1"/>
                 </a:solidFill>
               </a:defRPr>
             </a:lvl5pPr>
-            <a:lvl6pPr lvl="5" rtl="0" algn="r">
-              <a:buNone/>
-              <a:defRPr b="1" sz="2400">
+            <a:lvl6pPr lvl="5">
+              <a:buNone/>
+              <a:defRPr>
                 <a:solidFill>
                   <a:schemeClr val="dk1"/>
                 </a:solidFill>
               </a:defRPr>
             </a:lvl6pPr>
-            <a:lvl7pPr lvl="6" rtl="0" algn="r">
-              <a:buNone/>
-              <a:defRPr b="1" sz="2400">
+            <a:lvl7pPr lvl="6">
+              <a:buNone/>
+              <a:defRPr>
                 <a:solidFill>
                   <a:schemeClr val="dk1"/>
                 </a:solidFill>
               </a:defRPr>
             </a:lvl7pPr>
-            <a:lvl8pPr lvl="7" rtl="0" algn="r">
-              <a:buNone/>
-              <a:defRPr b="1" sz="2400">
+            <a:lvl8pPr lvl="7">
+              <a:buNone/>
+              <a:defRPr>
                 <a:solidFill>
                   <a:schemeClr val="dk1"/>
                 </a:solidFill>
               </a:defRPr>
             </a:lvl8pPr>
-            <a:lvl9pPr lvl="8" rtl="0" algn="r">
-              <a:buNone/>
-              <a:defRPr b="1" sz="2400">
+            <a:lvl9pPr lvl="8">
+              <a:buNone/>
+              <a:defRPr>
                 <a:solidFill>
                   <a:schemeClr val="dk1"/>
                 </a:solidFill>
@@ -3653,18 +3920,166 @@
               <a:buNone/>
             </a:pPr>
             <a:r>
-              <a:rPr b="0" lang="en" sz="1000" u="sng">
+              <a:rPr b="0" lang="en" sz="900" u="sng">
                 <a:solidFill>
                   <a:schemeClr val="hlink"/>
                 </a:solidFill>
                 <a:hlinkClick r:id="rId2"/>
               </a:rPr>
-              <a:t>https://profriehle.com</a:t>
-            </a:r>
-            <a:endParaRPr b="0" sz="1000"/>
+              <a:t>https://oss.cs.fau.de</a:t>
+            </a:r>
+            <a:endParaRPr>
+              <a:solidFill>
+                <a:schemeClr val="dk2"/>
+              </a:solidFill>
+            </a:endParaRPr>
           </a:p>
         </p:txBody>
       </p:sp>
+      <p:grpSp>
+        <p:nvGrpSpPr>
+          <p:cNvPr id="35" name="Google Shape;35;p5"/>
+          <p:cNvGrpSpPr/>
+          <p:nvPr/>
+        </p:nvGrpSpPr>
+        <p:grpSpPr>
+          <a:xfrm>
+            <a:off x="0" y="685800"/>
+            <a:ext cx="9144000" cy="91500"/>
+            <a:chOff x="0" y="2386584"/>
+            <a:chExt cx="9144000" cy="91500"/>
+          </a:xfrm>
+        </p:grpSpPr>
+        <p:sp>
+          <p:nvSpPr>
+            <p:cNvPr id="36" name="Google Shape;36;p5"/>
+            <p:cNvSpPr/>
+            <p:nvPr/>
+          </p:nvSpPr>
+          <p:spPr>
+            <a:xfrm>
+              <a:off x="0" y="2386584"/>
+              <a:ext cx="914400" cy="91500"/>
+            </a:xfrm>
+            <a:prstGeom prst="rect">
+              <a:avLst/>
+            </a:prstGeom>
+            <a:solidFill>
+              <a:schemeClr val="accent2"/>
+            </a:solidFill>
+            <a:ln>
+              <a:noFill/>
+            </a:ln>
+          </p:spPr>
+          <p:txBody>
+            <a:bodyPr anchorCtr="0" anchor="ctr" bIns="91425" lIns="91425" spcFirstLastPara="1" rIns="91425" wrap="square" tIns="91425">
+              <a:noAutofit/>
+            </a:bodyPr>
+            <a:lstStyle/>
+            <a:p>
+              <a:pPr indent="0" lvl="0" marL="0" rtl="0" algn="l">
+                <a:spcBef>
+                  <a:spcPts val="0"/>
+                </a:spcBef>
+                <a:spcAft>
+                  <a:spcPts val="0"/>
+                </a:spcAft>
+                <a:buNone/>
+              </a:pPr>
+              <a:r>
+                <a:t/>
+              </a:r>
+              <a:endParaRPr/>
+            </a:p>
+          </p:txBody>
+        </p:sp>
+        <p:sp>
+          <p:nvSpPr>
+            <p:cNvPr id="37" name="Google Shape;37;p5"/>
+            <p:cNvSpPr/>
+            <p:nvPr/>
+          </p:nvSpPr>
+          <p:spPr>
+            <a:xfrm>
+              <a:off x="914400" y="2386584"/>
+              <a:ext cx="1828800" cy="91500"/>
+            </a:xfrm>
+            <a:prstGeom prst="rect">
+              <a:avLst/>
+            </a:prstGeom>
+            <a:solidFill>
+              <a:schemeClr val="accent3"/>
+            </a:solidFill>
+            <a:ln>
+              <a:noFill/>
+            </a:ln>
+          </p:spPr>
+          <p:txBody>
+            <a:bodyPr anchorCtr="0" anchor="ctr" bIns="91425" lIns="91425" spcFirstLastPara="1" rIns="91425" wrap="square" tIns="91425">
+              <a:noAutofit/>
+            </a:bodyPr>
+            <a:lstStyle/>
+            <a:p>
+              <a:pPr indent="0" lvl="0" marL="0" rtl="0" algn="l">
+                <a:spcBef>
+                  <a:spcPts val="0"/>
+                </a:spcBef>
+                <a:spcAft>
+                  <a:spcPts val="0"/>
+                </a:spcAft>
+                <a:buNone/>
+              </a:pPr>
+              <a:r>
+                <a:t/>
+              </a:r>
+              <a:endParaRPr/>
+            </a:p>
+          </p:txBody>
+        </p:sp>
+        <p:sp>
+          <p:nvSpPr>
+            <p:cNvPr id="38" name="Google Shape;38;p5"/>
+            <p:cNvSpPr/>
+            <p:nvPr/>
+          </p:nvSpPr>
+          <p:spPr>
+            <a:xfrm>
+              <a:off x="2743200" y="2386584"/>
+              <a:ext cx="6400800" cy="91500"/>
+            </a:xfrm>
+            <a:prstGeom prst="rect">
+              <a:avLst/>
+            </a:prstGeom>
+            <a:solidFill>
+              <a:schemeClr val="accent4"/>
+            </a:solidFill>
+            <a:ln>
+              <a:noFill/>
+            </a:ln>
+          </p:spPr>
+          <p:txBody>
+            <a:bodyPr anchorCtr="0" anchor="ctr" bIns="91425" lIns="91425" spcFirstLastPara="1" rIns="91425" wrap="square" tIns="91425">
+              <a:noAutofit/>
+            </a:bodyPr>
+            <a:lstStyle/>
+            <a:p>
+              <a:pPr indent="0" lvl="0" marL="0" rtl="0" algn="l">
+                <a:spcBef>
+                  <a:spcPts val="0"/>
+                </a:spcBef>
+                <a:spcAft>
+                  <a:spcPts val="0"/>
+                </a:spcAft>
+                <a:buNone/>
+              </a:pPr>
+              <a:r>
+                <a:t/>
+              </a:r>
+              <a:endParaRPr/>
+            </a:p>
+          </p:txBody>
+        </p:sp>
+      </p:grpSp>
     </p:spTree>
   </p:cSld>
   <p:clrMapOvr>
@@ -3678,7 +4093,7 @@
   <p:cSld name="TITLE_ONLY">
     <p:spTree>
       <p:nvGrpSpPr>
-        <p:cNvPr id="27" name="Shape 27"/>
+        <p:cNvPr id="39" name="Shape 39"/>
         <p:cNvGrpSpPr/>
         <p:nvPr/>
       </p:nvGrpSpPr>
@@ -3692,7 +4107,7 @@
       </p:grpSpPr>
       <p:sp>
         <p:nvSpPr>
-          <p:cNvPr id="28" name="Google Shape;28;p6"/>
+          <p:cNvPr id="40" name="Google Shape;40;p6"/>
           <p:cNvSpPr txBox="1"/>
           <p:nvPr>
             <p:ph type="title"/>
@@ -3817,50 +4232,7 @@
       </p:sp>
       <p:sp>
         <p:nvSpPr>
-          <p:cNvPr id="29" name="Google Shape;29;p6"/>
-          <p:cNvSpPr/>
-          <p:nvPr/>
-        </p:nvSpPr>
-        <p:spPr>
-          <a:xfrm>
-            <a:off x="0" y="685800"/>
-            <a:ext cx="9144000" cy="91500"/>
-          </a:xfrm>
-          <a:prstGeom prst="rect">
-            <a:avLst/>
-          </a:prstGeom>
-          <a:solidFill>
-            <a:schemeClr val="accent4"/>
-          </a:solidFill>
-          <a:ln>
-            <a:noFill/>
-          </a:ln>
-        </p:spPr>
-        <p:txBody>
-          <a:bodyPr anchorCtr="0" anchor="ctr" bIns="91425" lIns="91425" spcFirstLastPara="1" rIns="91425" wrap="square" tIns="91425">
-            <a:noAutofit/>
-          </a:bodyPr>
-          <a:lstStyle/>
-          <a:p>
-            <a:pPr indent="0" lvl="0" marL="0" rtl="0" algn="l">
-              <a:spcBef>
-                <a:spcPts val="0"/>
-              </a:spcBef>
-              <a:spcAft>
-                <a:spcPts val="0"/>
-              </a:spcAft>
-              <a:buNone/>
-            </a:pPr>
-            <a:r>
-              <a:t/>
-            </a:r>
-            <a:endParaRPr/>
-          </a:p>
-        </p:txBody>
-      </p:sp>
-      <p:sp>
-        <p:nvSpPr>
-          <p:cNvPr id="30" name="Google Shape;30;p6"/>
+          <p:cNvPr id="41" name="Google Shape;41;p6"/>
           <p:cNvSpPr txBox="1"/>
           <p:nvPr>
             <p:ph idx="12" type="sldNum"/>
@@ -3868,8 +4240,8 @@
         </p:nvSpPr>
         <p:spPr>
           <a:xfrm>
-            <a:off x="7315209" y="4229101"/>
-            <a:ext cx="1828800" cy="914400"/>
+            <a:off x="7315202" y="4416550"/>
+            <a:ext cx="1828800" cy="731400"/>
           </a:xfrm>
           <a:prstGeom prst="rect">
             <a:avLst/>
@@ -3880,73 +4252,73 @@
             <a:noAutofit/>
           </a:bodyPr>
           <a:lstStyle>
-            <a:lvl1pPr lvl="0" rtl="0" algn="r">
-              <a:buNone/>
-              <a:defRPr b="1" sz="2400">
+            <a:lvl1pPr lvl="0">
+              <a:buNone/>
+              <a:defRPr>
                 <a:solidFill>
                   <a:schemeClr val="dk1"/>
                 </a:solidFill>
               </a:defRPr>
             </a:lvl1pPr>
-            <a:lvl2pPr lvl="1" rtl="0" algn="r">
-              <a:buNone/>
-              <a:defRPr b="1" sz="2400">
+            <a:lvl2pPr lvl="1">
+              <a:buNone/>
+              <a:defRPr>
                 <a:solidFill>
                   <a:schemeClr val="dk1"/>
                 </a:solidFill>
               </a:defRPr>
             </a:lvl2pPr>
-            <a:lvl3pPr lvl="2" rtl="0" algn="r">
-              <a:buNone/>
-              <a:defRPr b="1" sz="2400">
+            <a:lvl3pPr lvl="2">
+              <a:buNone/>
+              <a:defRPr>
                 <a:solidFill>
                   <a:schemeClr val="dk1"/>
                 </a:solidFill>
               </a:defRPr>
             </a:lvl3pPr>
-            <a:lvl4pPr lvl="3" rtl="0" algn="r">
-              <a:buNone/>
-              <a:defRPr b="1" sz="2400">
+            <a:lvl4pPr lvl="3">
+              <a:buNone/>
+              <a:defRPr>
                 <a:solidFill>
                   <a:schemeClr val="dk1"/>
                 </a:solidFill>
               </a:defRPr>
             </a:lvl4pPr>
-            <a:lvl5pPr lvl="4" rtl="0" algn="r">
-              <a:buNone/>
-              <a:defRPr b="1" sz="2400">
+            <a:lvl5pPr lvl="4">
+              <a:buNone/>
+              <a:defRPr>
                 <a:solidFill>
                   <a:schemeClr val="dk1"/>
                 </a:solidFill>
               </a:defRPr>
             </a:lvl5pPr>
-            <a:lvl6pPr lvl="5" rtl="0" algn="r">
-              <a:buNone/>
-              <a:defRPr b="1" sz="2400">
+            <a:lvl6pPr lvl="5">
+              <a:buNone/>
+              <a:defRPr>
                 <a:solidFill>
                   <a:schemeClr val="dk1"/>
                 </a:solidFill>
               </a:defRPr>
             </a:lvl6pPr>
-            <a:lvl7pPr lvl="6" rtl="0" algn="r">
-              <a:buNone/>
-              <a:defRPr b="1" sz="2400">
+            <a:lvl7pPr lvl="6">
+              <a:buNone/>
+              <a:defRPr>
                 <a:solidFill>
                   <a:schemeClr val="dk1"/>
                 </a:solidFill>
               </a:defRPr>
             </a:lvl7pPr>
-            <a:lvl8pPr lvl="7" rtl="0" algn="r">
-              <a:buNone/>
-              <a:defRPr b="1" sz="2400">
+            <a:lvl8pPr lvl="7">
+              <a:buNone/>
+              <a:defRPr>
                 <a:solidFill>
                   <a:schemeClr val="dk1"/>
                 </a:solidFill>
               </a:defRPr>
             </a:lvl8pPr>
-            <a:lvl9pPr lvl="8" rtl="0" algn="r">
-              <a:buNone/>
-              <a:defRPr b="1" sz="2400">
+            <a:lvl9pPr lvl="8">
+              <a:buNone/>
+              <a:defRPr>
                 <a:solidFill>
                   <a:schemeClr val="dk1"/>
                 </a:solidFill>
@@ -3977,26 +4349,177 @@
               <a:spcAft>
                 <a:spcPts val="0"/>
               </a:spcAft>
-              <a:buClr>
-                <a:schemeClr val="dk1"/>
-              </a:buClr>
-              <a:buSzPts val="1100"/>
-              <a:buFont typeface="Arial"/>
-              <a:buNone/>
-            </a:pPr>
-            <a:r>
-              <a:rPr b="0" lang="en" sz="1000" u="sng">
+              <a:buNone/>
+            </a:pPr>
+            <a:r>
+              <a:rPr b="0" lang="en" sz="900" u="sng">
                 <a:solidFill>
                   <a:schemeClr val="hlink"/>
                 </a:solidFill>
                 <a:hlinkClick r:id="rId2"/>
               </a:rPr>
-              <a:t>https://profriehle.com</a:t>
-            </a:r>
-            <a:endParaRPr b="0" sz="1000"/>
+              <a:t>https://oss.cs.fau.de</a:t>
+            </a:r>
+            <a:r>
+              <a:rPr b="0" lang="en" sz="900">
+                <a:solidFill>
+                  <a:schemeClr val="dk2"/>
+                </a:solidFill>
+              </a:rPr>
+              <a:t> </a:t>
+            </a:r>
+            <a:endParaRPr>
+              <a:solidFill>
+                <a:schemeClr val="dk2"/>
+              </a:solidFill>
+            </a:endParaRPr>
           </a:p>
         </p:txBody>
       </p:sp>
+      <p:grpSp>
+        <p:nvGrpSpPr>
+          <p:cNvPr id="42" name="Google Shape;42;p6"/>
+          <p:cNvGrpSpPr/>
+          <p:nvPr/>
+        </p:nvGrpSpPr>
+        <p:grpSpPr>
+          <a:xfrm>
+            <a:off x="0" y="685800"/>
+            <a:ext cx="9144000" cy="91500"/>
+            <a:chOff x="0" y="2386584"/>
+            <a:chExt cx="9144000" cy="91500"/>
+          </a:xfrm>
+        </p:grpSpPr>
+        <p:sp>
+          <p:nvSpPr>
+            <p:cNvPr id="43" name="Google Shape;43;p6"/>
+            <p:cNvSpPr/>
+            <p:nvPr/>
+          </p:nvSpPr>
+          <p:spPr>
+            <a:xfrm>
+              <a:off x="0" y="2386584"/>
+              <a:ext cx="914400" cy="91500"/>
+            </a:xfrm>
+            <a:prstGeom prst="rect">
+              <a:avLst/>
+            </a:prstGeom>
+            <a:solidFill>
+              <a:schemeClr val="accent2"/>
+            </a:solidFill>
+            <a:ln>
+              <a:noFill/>
+            </a:ln>
+          </p:spPr>
+          <p:txBody>
+            <a:bodyPr anchorCtr="0" anchor="ctr" bIns="91425" lIns="91425" spcFirstLastPara="1" rIns="91425" wrap="square" tIns="91425">
+              <a:noAutofit/>
+            </a:bodyPr>
+            <a:lstStyle/>
+            <a:p>
+              <a:pPr indent="0" lvl="0" marL="0" rtl="0" algn="l">
+                <a:spcBef>
+                  <a:spcPts val="0"/>
+                </a:spcBef>
+                <a:spcAft>
+                  <a:spcPts val="0"/>
+                </a:spcAft>
+                <a:buNone/>
+              </a:pPr>
+              <a:r>
+                <a:t/>
+              </a:r>
+              <a:endParaRPr/>
+            </a:p>
+          </p:txBody>
+        </p:sp>
+        <p:sp>
+          <p:nvSpPr>
+            <p:cNvPr id="44" name="Google Shape;44;p6"/>
+            <p:cNvSpPr/>
+            <p:nvPr/>
+          </p:nvSpPr>
+          <p:spPr>
+            <a:xfrm>
+              <a:off x="914400" y="2386584"/>
+              <a:ext cx="1828800" cy="91500"/>
+            </a:xfrm>
+            <a:prstGeom prst="rect">
+              <a:avLst/>
+            </a:prstGeom>
+            <a:solidFill>
+              <a:schemeClr val="accent3"/>
+            </a:solidFill>
+            <a:ln>
+              <a:noFill/>
+            </a:ln>
+          </p:spPr>
+          <p:txBody>
+            <a:bodyPr anchorCtr="0" anchor="ctr" bIns="91425" lIns="91425" spcFirstLastPara="1" rIns="91425" wrap="square" tIns="91425">
+              <a:noAutofit/>
+            </a:bodyPr>
+            <a:lstStyle/>
+            <a:p>
+              <a:pPr indent="0" lvl="0" marL="0" rtl="0" algn="l">
+                <a:spcBef>
+                  <a:spcPts val="0"/>
+                </a:spcBef>
+                <a:spcAft>
+                  <a:spcPts val="0"/>
+                </a:spcAft>
+                <a:buNone/>
+              </a:pPr>
+              <a:r>
+                <a:t/>
+              </a:r>
+              <a:endParaRPr/>
+            </a:p>
+          </p:txBody>
+        </p:sp>
+        <p:sp>
+          <p:nvSpPr>
+            <p:cNvPr id="45" name="Google Shape;45;p6"/>
+            <p:cNvSpPr/>
+            <p:nvPr/>
+          </p:nvSpPr>
+          <p:spPr>
+            <a:xfrm>
+              <a:off x="2743200" y="2386584"/>
+              <a:ext cx="6400800" cy="91500"/>
+            </a:xfrm>
+            <a:prstGeom prst="rect">
+              <a:avLst/>
+            </a:prstGeom>
+            <a:solidFill>
+              <a:schemeClr val="accent4"/>
+            </a:solidFill>
+            <a:ln>
+              <a:noFill/>
+            </a:ln>
+          </p:spPr>
+          <p:txBody>
+            <a:bodyPr anchorCtr="0" anchor="ctr" bIns="91425" lIns="91425" spcFirstLastPara="1" rIns="91425" wrap="square" tIns="91425">
+              <a:noAutofit/>
+            </a:bodyPr>
+            <a:lstStyle/>
+            <a:p>
+              <a:pPr indent="0" lvl="0" marL="0" rtl="0" algn="l">
+                <a:spcBef>
+                  <a:spcPts val="0"/>
+                </a:spcBef>
+                <a:spcAft>
+                  <a:spcPts val="0"/>
+                </a:spcAft>
+                <a:buNone/>
+              </a:pPr>
+              <a:r>
+                <a:t/>
+              </a:r>
+              <a:endParaRPr/>
+            </a:p>
+          </p:txBody>
+        </p:sp>
+      </p:grpSp>
     </p:spTree>
   </p:cSld>
   <p:clrMapOvr>
@@ -4010,7 +4533,7 @@
   <p:cSld name="BLANK">
     <p:spTree>
       <p:nvGrpSpPr>
-        <p:cNvPr id="31" name="Shape 31"/>
+        <p:cNvPr id="46" name="Shape 46"/>
         <p:cNvGrpSpPr/>
         <p:nvPr/>
       </p:nvGrpSpPr>
@@ -4475,8 +4998,8 @@
         </p:nvSpPr>
         <p:spPr>
           <a:xfrm>
-            <a:off x="7315209" y="4229101"/>
-            <a:ext cx="1828800" cy="914400"/>
+            <a:off x="7315202" y="4416550"/>
+            <a:ext cx="1828800" cy="731400"/>
           </a:xfrm>
           <a:prstGeom prst="rect">
             <a:avLst/>
@@ -4495,7 +5018,7 @@
               <a:buNone/>
               <a:defRPr b="1" sz="2400">
                 <a:solidFill>
-                  <a:schemeClr val="dk1"/>
+                  <a:schemeClr val="dk2"/>
                 </a:solidFill>
               </a:defRPr>
             </a:lvl1pPr>
@@ -4503,7 +5026,7 @@
               <a:buNone/>
               <a:defRPr b="1" sz="2400">
                 <a:solidFill>
-                  <a:schemeClr val="dk1"/>
+                  <a:schemeClr val="dk2"/>
                 </a:solidFill>
               </a:defRPr>
             </a:lvl2pPr>
@@ -4511,7 +5034,7 @@
               <a:buNone/>
               <a:defRPr b="1" sz="2400">
                 <a:solidFill>
-                  <a:schemeClr val="dk1"/>
+                  <a:schemeClr val="dk2"/>
                 </a:solidFill>
               </a:defRPr>
             </a:lvl3pPr>
@@ -4519,7 +5042,7 @@
               <a:buNone/>
               <a:defRPr b="1" sz="2400">
                 <a:solidFill>
-                  <a:schemeClr val="dk1"/>
+                  <a:schemeClr val="dk2"/>
                 </a:solidFill>
               </a:defRPr>
             </a:lvl4pPr>
@@ -4527,7 +5050,7 @@
               <a:buNone/>
               <a:defRPr b="1" sz="2400">
                 <a:solidFill>
-                  <a:schemeClr val="dk1"/>
+                  <a:schemeClr val="dk2"/>
                 </a:solidFill>
               </a:defRPr>
             </a:lvl5pPr>
@@ -4535,7 +5058,7 @@
               <a:buNone/>
               <a:defRPr b="1" sz="2400">
                 <a:solidFill>
-                  <a:schemeClr val="dk1"/>
+                  <a:schemeClr val="dk2"/>
                 </a:solidFill>
               </a:defRPr>
             </a:lvl6pPr>
@@ -4543,7 +5066,7 @@
               <a:buNone/>
               <a:defRPr b="1" sz="2400">
                 <a:solidFill>
-                  <a:schemeClr val="dk1"/>
+                  <a:schemeClr val="dk2"/>
                 </a:solidFill>
               </a:defRPr>
             </a:lvl7pPr>
@@ -4551,7 +5074,7 @@
               <a:buNone/>
               <a:defRPr b="1" sz="2400">
                 <a:solidFill>
-                  <a:schemeClr val="dk1"/>
+                  <a:schemeClr val="dk2"/>
                 </a:solidFill>
               </a:defRPr>
             </a:lvl8pPr>
@@ -4559,7 +5082,7 @@
               <a:buNone/>
               <a:defRPr b="1" sz="2400">
                 <a:solidFill>
-                  <a:schemeClr val="dk1"/>
+                  <a:schemeClr val="dk2"/>
                 </a:solidFill>
               </a:defRPr>
             </a:lvl9pPr>
@@ -4591,19 +5114,19 @@
               <a:buNone/>
             </a:pPr>
             <a:r>
-              <a:rPr b="0" lang="en" sz="1000" u="sng">
+              <a:rPr b="0" lang="en" sz="900" u="sng">
                 <a:solidFill>
                   <a:schemeClr val="hlink"/>
                 </a:solidFill>
                 <a:hlinkClick r:id="rId1"/>
               </a:rPr>
-              <a:t>https://profriehle.com</a:t>
-            </a:r>
-            <a:r>
-              <a:rPr b="0" lang="en" sz="1000"/>
-              <a:t>  </a:t>
-            </a:r>
-            <a:endParaRPr b="0" sz="1000"/>
+              <a:t>https://oss.cs.fau.de</a:t>
+            </a:r>
+            <a:r>
+              <a:rPr b="0" lang="en" sz="900"/>
+              <a:t> </a:t>
+            </a:r>
+            <a:endParaRPr b="0" sz="900"/>
           </a:p>
         </p:txBody>
       </p:sp>
@@ -5316,7 +5839,7 @@
   <p:cSld>
     <p:spTree>
       <p:nvGrpSpPr>
-        <p:cNvPr id="35" name="Shape 35"/>
+        <p:cNvPr id="50" name="Shape 50"/>
         <p:cNvGrpSpPr/>
         <p:nvPr/>
       </p:nvGrpSpPr>
@@ -5330,7 +5853,7 @@
       </p:grpSpPr>
       <p:sp>
         <p:nvSpPr>
-          <p:cNvPr id="36" name="Google Shape;36;p8"/>
+          <p:cNvPr id="51" name="Google Shape;51;p8"/>
           <p:cNvSpPr txBox="1"/>
           <p:nvPr>
             <p:ph type="ctrTitle"/>
@@ -5370,7 +5893,7 @@
       </p:sp>
       <p:sp>
         <p:nvSpPr>
-          <p:cNvPr id="37" name="Google Shape;37;p8"/>
+          <p:cNvPr id="52" name="Google Shape;52;p8"/>
           <p:cNvSpPr txBox="1"/>
           <p:nvPr>
             <p:ph idx="1" type="subTitle"/>
@@ -5477,7 +6000,7 @@
   <p:cSld>
     <p:spTree>
       <p:nvGrpSpPr>
-        <p:cNvPr id="98" name="Shape 98"/>
+        <p:cNvPr id="113" name="Shape 113"/>
         <p:cNvGrpSpPr/>
         <p:nvPr/>
       </p:nvGrpSpPr>
@@ -5491,7 +6014,7 @@
       </p:grpSpPr>
       <p:sp>
         <p:nvSpPr>
-          <p:cNvPr id="99" name="Google Shape;99;p17"/>
+          <p:cNvPr id="114" name="Google Shape;114;p17"/>
           <p:cNvSpPr txBox="1"/>
           <p:nvPr>
             <p:ph type="title"/>
@@ -5531,7 +6054,7 @@
       </p:sp>
       <p:sp>
         <p:nvSpPr>
-          <p:cNvPr id="100" name="Google Shape;100;p17"/>
+          <p:cNvPr id="115" name="Google Shape;115;p17"/>
           <p:cNvSpPr txBox="1"/>
           <p:nvPr>
             <p:ph idx="1" type="body"/>
@@ -5688,7 +6211,7 @@
       </p:sp>
       <p:sp>
         <p:nvSpPr>
-          <p:cNvPr id="101" name="Google Shape;101;p17"/>
+          <p:cNvPr id="116" name="Google Shape;116;p17"/>
           <p:cNvSpPr txBox="1"/>
           <p:nvPr>
             <p:ph idx="12" type="sldNum"/>
@@ -5696,8 +6219,8 @@
         </p:nvSpPr>
         <p:spPr>
           <a:xfrm>
-            <a:off x="7315209" y="4229101"/>
-            <a:ext cx="1828800" cy="914400"/>
+            <a:off x="7315202" y="4416550"/>
+            <a:ext cx="1828800" cy="731400"/>
           </a:xfrm>
           <a:prstGeom prst="rect">
             <a:avLst/>
@@ -5732,23 +6255,30 @@
               <a:spcAft>
                 <a:spcPts val="0"/>
               </a:spcAft>
-              <a:buClr>
-                <a:schemeClr val="dk1"/>
-              </a:buClr>
-              <a:buSzPts val="1100"/>
-              <a:buFont typeface="Arial"/>
-              <a:buNone/>
-            </a:pPr>
-            <a:r>
-              <a:rPr b="0" lang="en" sz="1000" u="sng">
+              <a:buNone/>
+            </a:pPr>
+            <a:r>
+              <a:rPr b="0" lang="en" sz="900" u="sng">
                 <a:solidFill>
                   <a:schemeClr val="hlink"/>
                 </a:solidFill>
                 <a:hlinkClick r:id="rId4"/>
               </a:rPr>
-              <a:t>https://profriehle.com</a:t>
-            </a:r>
-            <a:endParaRPr b="0" sz="1000"/>
+              <a:t>https://oss.cs.fau.de</a:t>
+            </a:r>
+            <a:r>
+              <a:rPr b="0" lang="en" sz="900">
+                <a:solidFill>
+                  <a:schemeClr val="dk2"/>
+                </a:solidFill>
+              </a:rPr>
+              <a:t> </a:t>
+            </a:r>
+            <a:endParaRPr b="0" sz="900">
+              <a:solidFill>
+                <a:schemeClr val="dk2"/>
+              </a:solidFill>
+            </a:endParaRPr>
           </a:p>
         </p:txBody>
       </p:sp>
@@ -5765,7 +6295,7 @@
   <p:cSld>
     <p:spTree>
       <p:nvGrpSpPr>
-        <p:cNvPr id="105" name="Shape 105"/>
+        <p:cNvPr id="120" name="Shape 120"/>
         <p:cNvGrpSpPr/>
         <p:nvPr/>
       </p:nvGrpSpPr>
@@ -5779,7 +6309,7 @@
       </p:grpSpPr>
       <p:sp>
         <p:nvSpPr>
-          <p:cNvPr id="106" name="Google Shape;106;p18"/>
+          <p:cNvPr id="121" name="Google Shape;121;p18"/>
           <p:cNvSpPr txBox="1"/>
           <p:nvPr>
             <p:ph type="title"/>
@@ -5819,7 +6349,7 @@
       </p:sp>
       <p:sp>
         <p:nvSpPr>
-          <p:cNvPr id="107" name="Google Shape;107;p18"/>
+          <p:cNvPr id="122" name="Google Shape;122;p18"/>
           <p:cNvSpPr txBox="1"/>
           <p:nvPr>
             <p:ph idx="1" type="body"/>
@@ -5976,7 +6506,7 @@
       </p:sp>
       <p:sp>
         <p:nvSpPr>
-          <p:cNvPr id="108" name="Google Shape;108;p18"/>
+          <p:cNvPr id="123" name="Google Shape;123;p18"/>
           <p:cNvSpPr txBox="1"/>
           <p:nvPr>
             <p:ph idx="12" type="sldNum"/>
@@ -5984,8 +6514,8 @@
         </p:nvSpPr>
         <p:spPr>
           <a:xfrm>
-            <a:off x="7315209" y="4229101"/>
-            <a:ext cx="1828800" cy="914400"/>
+            <a:off x="7315202" y="4416550"/>
+            <a:ext cx="1828800" cy="731400"/>
           </a:xfrm>
           <a:prstGeom prst="rect">
             <a:avLst/>
@@ -6020,23 +6550,30 @@
               <a:spcAft>
                 <a:spcPts val="0"/>
               </a:spcAft>
-              <a:buClr>
-                <a:schemeClr val="dk1"/>
-              </a:buClr>
-              <a:buSzPts val="1100"/>
-              <a:buFont typeface="Arial"/>
-              <a:buNone/>
-            </a:pPr>
-            <a:r>
-              <a:rPr b="0" lang="en" sz="1000" u="sng">
+              <a:buNone/>
+            </a:pPr>
+            <a:r>
+              <a:rPr b="0" lang="en" sz="900" u="sng">
                 <a:solidFill>
                   <a:schemeClr val="hlink"/>
                 </a:solidFill>
                 <a:hlinkClick r:id="rId3"/>
               </a:rPr>
-              <a:t>https://profriehle.com</a:t>
-            </a:r>
-            <a:endParaRPr b="0" sz="1000"/>
+              <a:t>https://oss.cs.fau.de</a:t>
+            </a:r>
+            <a:r>
+              <a:rPr b="0" lang="en" sz="900">
+                <a:solidFill>
+                  <a:schemeClr val="dk2"/>
+                </a:solidFill>
+              </a:rPr>
+              <a:t> </a:t>
+            </a:r>
+            <a:endParaRPr b="0" sz="900">
+              <a:solidFill>
+                <a:schemeClr val="dk2"/>
+              </a:solidFill>
+            </a:endParaRPr>
           </a:p>
         </p:txBody>
       </p:sp>
@@ -6053,7 +6590,7 @@
   <p:cSld>
     <p:spTree>
       <p:nvGrpSpPr>
-        <p:cNvPr id="112" name="Shape 112"/>
+        <p:cNvPr id="127" name="Shape 127"/>
         <p:cNvGrpSpPr/>
         <p:nvPr/>
       </p:nvGrpSpPr>
@@ -6067,7 +6604,7 @@
       </p:grpSpPr>
       <p:sp>
         <p:nvSpPr>
-          <p:cNvPr id="113" name="Google Shape;113;p19"/>
+          <p:cNvPr id="128" name="Google Shape;128;p19"/>
           <p:cNvSpPr txBox="1"/>
           <p:nvPr>
             <p:ph type="title"/>
@@ -6107,7 +6644,7 @@
       </p:sp>
       <p:sp>
         <p:nvSpPr>
-          <p:cNvPr id="114" name="Google Shape;114;p19"/>
+          <p:cNvPr id="129" name="Google Shape;129;p19"/>
           <p:cNvSpPr txBox="1"/>
           <p:nvPr>
             <p:ph idx="1" type="body"/>
@@ -6302,7 +6839,7 @@
       </p:sp>
       <p:sp>
         <p:nvSpPr>
-          <p:cNvPr id="115" name="Google Shape;115;p19"/>
+          <p:cNvPr id="130" name="Google Shape;130;p19"/>
           <p:cNvSpPr txBox="1"/>
           <p:nvPr>
             <p:ph idx="12" type="sldNum"/>
@@ -6310,8 +6847,8 @@
         </p:nvSpPr>
         <p:spPr>
           <a:xfrm>
-            <a:off x="7315209" y="4229101"/>
-            <a:ext cx="1828800" cy="914400"/>
+            <a:off x="7315202" y="4416550"/>
+            <a:ext cx="1828800" cy="731400"/>
           </a:xfrm>
           <a:prstGeom prst="rect">
             <a:avLst/>
@@ -6346,23 +6883,30 @@
               <a:spcAft>
                 <a:spcPts val="0"/>
               </a:spcAft>
-              <a:buClr>
-                <a:schemeClr val="dk1"/>
-              </a:buClr>
-              <a:buSzPts val="1100"/>
-              <a:buFont typeface="Arial"/>
-              <a:buNone/>
-            </a:pPr>
-            <a:r>
-              <a:rPr b="0" lang="en" sz="1000" u="sng">
+              <a:buNone/>
+            </a:pPr>
+            <a:r>
+              <a:rPr b="0" lang="en" sz="900" u="sng">
                 <a:solidFill>
                   <a:schemeClr val="hlink"/>
                 </a:solidFill>
                 <a:hlinkClick r:id="rId3"/>
               </a:rPr>
-              <a:t>https://profriehle.com</a:t>
-            </a:r>
-            <a:endParaRPr b="0" sz="1000"/>
+              <a:t>https://oss.cs.fau.de</a:t>
+            </a:r>
+            <a:r>
+              <a:rPr b="0" lang="en" sz="900">
+                <a:solidFill>
+                  <a:schemeClr val="dk2"/>
+                </a:solidFill>
+              </a:rPr>
+              <a:t> </a:t>
+            </a:r>
+            <a:endParaRPr b="0" sz="900">
+              <a:solidFill>
+                <a:schemeClr val="dk2"/>
+              </a:solidFill>
+            </a:endParaRPr>
           </a:p>
         </p:txBody>
       </p:sp>
@@ -6379,7 +6923,7 @@
   <p:cSld>
     <p:spTree>
       <p:nvGrpSpPr>
-        <p:cNvPr id="119" name="Shape 119"/>
+        <p:cNvPr id="134" name="Shape 134"/>
         <p:cNvGrpSpPr/>
         <p:nvPr/>
       </p:nvGrpSpPr>
@@ -6393,7 +6937,7 @@
       </p:grpSpPr>
       <p:sp>
         <p:nvSpPr>
-          <p:cNvPr id="120" name="Google Shape;120;p20"/>
+          <p:cNvPr id="135" name="Google Shape;135;p20"/>
           <p:cNvSpPr txBox="1"/>
           <p:nvPr>
             <p:ph type="ctrTitle"/>
@@ -6433,7 +6977,7 @@
       </p:sp>
       <p:sp>
         <p:nvSpPr>
-          <p:cNvPr id="121" name="Google Shape;121;p20"/>
+          <p:cNvPr id="136" name="Google Shape;136;p20"/>
           <p:cNvSpPr txBox="1"/>
           <p:nvPr>
             <p:ph idx="1" type="subTitle"/>
@@ -6563,7 +7107,7 @@
   <p:cSld>
     <p:spTree>
       <p:nvGrpSpPr>
-        <p:cNvPr id="125" name="Shape 125"/>
+        <p:cNvPr id="140" name="Shape 140"/>
         <p:cNvGrpSpPr/>
         <p:nvPr/>
       </p:nvGrpSpPr>
@@ -6577,7 +7121,7 @@
       </p:grpSpPr>
       <p:sp>
         <p:nvSpPr>
-          <p:cNvPr id="126" name="Google Shape;126;p21"/>
+          <p:cNvPr id="141" name="Google Shape;141;p21"/>
           <p:cNvSpPr txBox="1"/>
           <p:nvPr>
             <p:ph type="title"/>
@@ -6617,7 +7161,7 @@
       </p:sp>
       <p:sp>
         <p:nvSpPr>
-          <p:cNvPr id="127" name="Google Shape;127;p21"/>
+          <p:cNvPr id="142" name="Google Shape;142;p21"/>
           <p:cNvSpPr txBox="1"/>
           <p:nvPr>
             <p:ph idx="12" type="sldNum"/>
@@ -6625,8 +7169,8 @@
         </p:nvSpPr>
         <p:spPr>
           <a:xfrm>
-            <a:off x="7315209" y="4229101"/>
-            <a:ext cx="1828800" cy="914400"/>
+            <a:off x="7315202" y="4416550"/>
+            <a:ext cx="1828800" cy="731400"/>
           </a:xfrm>
           <a:prstGeom prst="rect">
             <a:avLst/>
@@ -6670,7 +7214,7 @@
                 </a:solidFill>
                 <a:hlinkClick r:id="rId3"/>
               </a:rPr>
-              <a:t>https://profriehle.com</a:t>
+              <a:t>https://oss.cs.fau.de</a:t>
             </a:r>
             <a:r>
               <a:rPr b="0" lang="en" sz="900">
@@ -6690,7 +7234,7 @@
       </p:sp>
       <p:sp>
         <p:nvSpPr>
-          <p:cNvPr id="128" name="Google Shape;128;p21"/>
+          <p:cNvPr id="143" name="Google Shape;143;p21"/>
           <p:cNvSpPr txBox="1"/>
           <p:nvPr>
             <p:ph idx="1" type="body"/>
@@ -6819,7 +7363,7 @@
   <p:cSld>
     <p:spTree>
       <p:nvGrpSpPr>
-        <p:cNvPr id="41" name="Shape 41"/>
+        <p:cNvPr id="56" name="Shape 56"/>
         <p:cNvGrpSpPr/>
         <p:nvPr/>
       </p:nvGrpSpPr>
@@ -6833,7 +7377,7 @@
       </p:grpSpPr>
       <p:sp>
         <p:nvSpPr>
-          <p:cNvPr id="42" name="Google Shape;42;p9"/>
+          <p:cNvPr id="57" name="Google Shape;57;p9"/>
           <p:cNvSpPr txBox="1"/>
           <p:nvPr>
             <p:ph type="title"/>
@@ -6873,7 +7417,7 @@
       </p:sp>
       <p:sp>
         <p:nvSpPr>
-          <p:cNvPr id="43" name="Google Shape;43;p9"/>
+          <p:cNvPr id="58" name="Google Shape;58;p9"/>
           <p:cNvSpPr txBox="1"/>
           <p:nvPr>
             <p:ph idx="1" type="body"/>
@@ -7048,7 +7592,7 @@
       </p:sp>
       <p:sp>
         <p:nvSpPr>
-          <p:cNvPr id="44" name="Google Shape;44;p9"/>
+          <p:cNvPr id="59" name="Google Shape;59;p9"/>
           <p:cNvSpPr txBox="1"/>
           <p:nvPr>
             <p:ph idx="12" type="sldNum"/>
@@ -7056,8 +7600,8 @@
         </p:nvSpPr>
         <p:spPr>
           <a:xfrm>
-            <a:off x="7315209" y="4229101"/>
-            <a:ext cx="1828800" cy="914400"/>
+            <a:off x="7315202" y="4416550"/>
+            <a:ext cx="1828800" cy="731400"/>
           </a:xfrm>
           <a:prstGeom prst="rect">
             <a:avLst/>
@@ -7095,15 +7639,27 @@
               <a:buNone/>
             </a:pPr>
             <a:r>
-              <a:rPr b="0" lang="en" sz="1000" u="sng">
+              <a:rPr b="0" lang="en" sz="900" u="sng">
                 <a:solidFill>
                   <a:schemeClr val="hlink"/>
                 </a:solidFill>
                 <a:hlinkClick r:id="rId3"/>
               </a:rPr>
-              <a:t>https://profriehle.com</a:t>
-            </a:r>
-            <a:endParaRPr b="0" sz="1000"/>
+              <a:t>https://oss.cs.fau.de</a:t>
+            </a:r>
+            <a:r>
+              <a:rPr b="0" lang="en" sz="900">
+                <a:solidFill>
+                  <a:schemeClr val="dk2"/>
+                </a:solidFill>
+              </a:rPr>
+              <a:t> </a:t>
+            </a:r>
+            <a:endParaRPr b="0" sz="900">
+              <a:solidFill>
+                <a:schemeClr val="dk2"/>
+              </a:solidFill>
+            </a:endParaRPr>
           </a:p>
         </p:txBody>
       </p:sp>
@@ -7120,7 +7676,7 @@
   <p:cSld>
     <p:spTree>
       <p:nvGrpSpPr>
-        <p:cNvPr id="48" name="Shape 48"/>
+        <p:cNvPr id="63" name="Shape 63"/>
         <p:cNvGrpSpPr/>
         <p:nvPr/>
       </p:nvGrpSpPr>
@@ -7134,7 +7690,7 @@
       </p:grpSpPr>
       <p:sp>
         <p:nvSpPr>
-          <p:cNvPr id="49" name="Google Shape;49;p10"/>
+          <p:cNvPr id="64" name="Google Shape;64;p10"/>
           <p:cNvSpPr txBox="1"/>
           <p:nvPr>
             <p:ph type="title"/>
@@ -7174,7 +7730,7 @@
       </p:sp>
       <p:sp>
         <p:nvSpPr>
-          <p:cNvPr id="50" name="Google Shape;50;p10"/>
+          <p:cNvPr id="65" name="Google Shape;65;p10"/>
           <p:cNvSpPr txBox="1"/>
           <p:nvPr>
             <p:ph idx="1" type="body"/>
@@ -7335,7 +7891,7 @@
       </p:sp>
       <p:sp>
         <p:nvSpPr>
-          <p:cNvPr id="51" name="Google Shape;51;p10"/>
+          <p:cNvPr id="66" name="Google Shape;66;p10"/>
           <p:cNvSpPr txBox="1"/>
           <p:nvPr>
             <p:ph idx="12" type="sldNum"/>
@@ -7343,8 +7899,8 @@
         </p:nvSpPr>
         <p:spPr>
           <a:xfrm>
-            <a:off x="7315209" y="4229101"/>
-            <a:ext cx="1828800" cy="914400"/>
+            <a:off x="7315202" y="4416550"/>
+            <a:ext cx="1828800" cy="731400"/>
           </a:xfrm>
           <a:prstGeom prst="rect">
             <a:avLst/>
@@ -7379,23 +7935,30 @@
               <a:spcAft>
                 <a:spcPts val="0"/>
               </a:spcAft>
-              <a:buClr>
-                <a:schemeClr val="dk1"/>
-              </a:buClr>
-              <a:buSzPts val="1100"/>
-              <a:buFont typeface="Arial"/>
-              <a:buNone/>
-            </a:pPr>
-            <a:r>
-              <a:rPr b="0" lang="en" sz="1000" u="sng">
+              <a:buNone/>
+            </a:pPr>
+            <a:r>
+              <a:rPr b="0" lang="en" sz="900" u="sng">
                 <a:solidFill>
                   <a:schemeClr val="hlink"/>
                 </a:solidFill>
                 <a:hlinkClick r:id="rId3"/>
               </a:rPr>
-              <a:t>https://profriehle.com</a:t>
-            </a:r>
-            <a:endParaRPr b="0" sz="1000"/>
+              <a:t>https://oss.cs.fau.de</a:t>
+            </a:r>
+            <a:r>
+              <a:rPr b="0" lang="en" sz="900">
+                <a:solidFill>
+                  <a:schemeClr val="dk2"/>
+                </a:solidFill>
+              </a:rPr>
+              <a:t> </a:t>
+            </a:r>
+            <a:endParaRPr b="0" sz="900">
+              <a:solidFill>
+                <a:schemeClr val="dk2"/>
+              </a:solidFill>
+            </a:endParaRPr>
           </a:p>
         </p:txBody>
       </p:sp>
@@ -7412,7 +7975,7 @@
   <p:cSld>
     <p:spTree>
       <p:nvGrpSpPr>
-        <p:cNvPr id="55" name="Shape 55"/>
+        <p:cNvPr id="70" name="Shape 70"/>
         <p:cNvGrpSpPr/>
         <p:nvPr/>
       </p:nvGrpSpPr>
@@ -7426,7 +7989,7 @@
       </p:grpSpPr>
       <p:sp>
         <p:nvSpPr>
-          <p:cNvPr id="56" name="Google Shape;56;p11"/>
+          <p:cNvPr id="71" name="Google Shape;71;p11"/>
           <p:cNvSpPr txBox="1"/>
           <p:nvPr>
             <p:ph idx="1" type="body"/>
@@ -7531,7 +8094,7 @@
       </p:sp>
       <p:sp>
         <p:nvSpPr>
-          <p:cNvPr id="57" name="Google Shape;57;p11"/>
+          <p:cNvPr id="72" name="Google Shape;72;p11"/>
           <p:cNvSpPr txBox="1"/>
           <p:nvPr>
             <p:ph type="title"/>
@@ -7571,7 +8134,7 @@
       </p:sp>
       <p:sp>
         <p:nvSpPr>
-          <p:cNvPr id="58" name="Google Shape;58;p11"/>
+          <p:cNvPr id="73" name="Google Shape;73;p11"/>
           <p:cNvSpPr txBox="1"/>
           <p:nvPr>
             <p:ph idx="12" type="sldNum"/>
@@ -7579,8 +8142,8 @@
         </p:nvSpPr>
         <p:spPr>
           <a:xfrm>
-            <a:off x="7315209" y="4229101"/>
-            <a:ext cx="1828800" cy="914400"/>
+            <a:off x="7315202" y="4416550"/>
+            <a:ext cx="1828800" cy="731400"/>
           </a:xfrm>
           <a:prstGeom prst="rect">
             <a:avLst/>
@@ -7615,29 +8178,36 @@
               <a:spcAft>
                 <a:spcPts val="0"/>
               </a:spcAft>
-              <a:buClr>
-                <a:schemeClr val="dk1"/>
-              </a:buClr>
-              <a:buSzPts val="1100"/>
-              <a:buFont typeface="Arial"/>
-              <a:buNone/>
-            </a:pPr>
-            <a:r>
-              <a:rPr b="0" lang="en" sz="1000" u="sng">
+              <a:buNone/>
+            </a:pPr>
+            <a:r>
+              <a:rPr b="0" lang="en" sz="900" u="sng">
                 <a:solidFill>
                   <a:schemeClr val="hlink"/>
                 </a:solidFill>
                 <a:hlinkClick r:id="rId3"/>
               </a:rPr>
-              <a:t>https://profriehle.com</a:t>
-            </a:r>
-            <a:endParaRPr b="0" sz="1000"/>
+              <a:t>https://oss.cs.fau.de</a:t>
+            </a:r>
+            <a:r>
+              <a:rPr b="0" lang="en" sz="900">
+                <a:solidFill>
+                  <a:schemeClr val="dk2"/>
+                </a:solidFill>
+              </a:rPr>
+              <a:t> </a:t>
+            </a:r>
+            <a:endParaRPr b="0" sz="900">
+              <a:solidFill>
+                <a:schemeClr val="dk2"/>
+              </a:solidFill>
+            </a:endParaRPr>
           </a:p>
         </p:txBody>
       </p:sp>
       <p:sp>
         <p:nvSpPr>
-          <p:cNvPr id="59" name="Google Shape;59;p11"/>
+          <p:cNvPr id="74" name="Google Shape;74;p11"/>
           <p:cNvSpPr txBox="1"/>
           <p:nvPr/>
         </p:nvSpPr>
@@ -7690,7 +8260,7 @@
   <p:cSld>
     <p:spTree>
       <p:nvGrpSpPr>
-        <p:cNvPr id="63" name="Shape 63"/>
+        <p:cNvPr id="78" name="Shape 78"/>
         <p:cNvGrpSpPr/>
         <p:nvPr/>
       </p:nvGrpSpPr>
@@ -7704,7 +8274,7 @@
       </p:grpSpPr>
       <p:sp>
         <p:nvSpPr>
-          <p:cNvPr id="64" name="Google Shape;64;p12"/>
+          <p:cNvPr id="79" name="Google Shape;79;p12"/>
           <p:cNvSpPr txBox="1"/>
           <p:nvPr>
             <p:ph type="title"/>
@@ -7744,7 +8314,7 @@
       </p:sp>
       <p:sp>
         <p:nvSpPr>
-          <p:cNvPr id="65" name="Google Shape;65;p12"/>
+          <p:cNvPr id="80" name="Google Shape;80;p12"/>
           <p:cNvSpPr txBox="1"/>
           <p:nvPr>
             <p:ph idx="1" type="body"/>
@@ -7857,25 +8427,9 @@
             <a:endParaRPr/>
           </a:p>
           <a:p>
-            <a:pPr indent="0" lvl="0" marL="0" rtl="0" algn="l">
-              <a:spcBef>
-                <a:spcPts val="1200"/>
-              </a:spcBef>
-              <a:spcAft>
-                <a:spcPts val="0"/>
-              </a:spcAft>
-              <a:buNone/>
-            </a:pPr>
-            <a:r>
-              <a:rPr lang="en"/>
-              <a:t>Example</a:t>
-            </a:r>
-            <a:endParaRPr/>
-          </a:p>
-          <a:p>
             <a:pPr indent="-342900" lvl="0" marL="457200" rtl="0" algn="l">
               <a:spcBef>
-                <a:spcPts val="1200"/>
+                <a:spcPts val="0"/>
               </a:spcBef>
               <a:spcAft>
                 <a:spcPts val="0"/>
@@ -7885,14 +8439,30 @@
             </a:pPr>
             <a:r>
               <a:rPr lang="en"/>
-              <a:t>apt install curl</a:t>
+              <a:t>For your user account (not root user if on your own machine)</a:t>
+            </a:r>
+            <a:endParaRPr/>
+          </a:p>
+          <a:p>
+            <a:pPr indent="0" lvl="0" marL="0" rtl="0" algn="l">
+              <a:spcBef>
+                <a:spcPts val="1200"/>
+              </a:spcBef>
+              <a:spcAft>
+                <a:spcPts val="0"/>
+              </a:spcAft>
+              <a:buNone/>
+            </a:pPr>
+            <a:r>
+              <a:rPr lang="en"/>
+              <a:t>Example</a:t>
             </a:r>
             <a:endParaRPr/>
           </a:p>
           <a:p>
             <a:pPr indent="-342900" lvl="0" marL="457200" rtl="0" algn="l">
               <a:spcBef>
-                <a:spcPts val="0"/>
+                <a:spcPts val="1200"/>
               </a:spcBef>
               <a:spcAft>
                 <a:spcPts val="0"/>
@@ -7902,7 +8472,7 @@
             </a:pPr>
             <a:r>
               <a:rPr lang="en"/>
-              <a:t>curl -o- https://raw.githubusercontent.com/nvm-sh/nvm/v0.40.0/install.sh | bash</a:t>
+              <a:t>apt install curl</a:t>
             </a:r>
             <a:endParaRPr/>
           </a:p>
@@ -7919,7 +8489,24 @@
             </a:pPr>
             <a:r>
               <a:rPr lang="en"/>
-              <a:t>nvm install 20</a:t>
+              <a:t>curl -o- https://raw.githubusercontent.com/nvm-sh/nvm/v0.40.0/install.sh | bash</a:t>
+            </a:r>
+            <a:endParaRPr/>
+          </a:p>
+          <a:p>
+            <a:pPr indent="-342900" lvl="0" marL="457200" rtl="0" algn="l">
+              <a:spcBef>
+                <a:spcPts val="0"/>
+              </a:spcBef>
+              <a:spcAft>
+                <a:spcPts val="0"/>
+              </a:spcAft>
+              <a:buSzPts val="1800"/>
+              <a:buChar char="●"/>
+            </a:pPr>
+            <a:r>
+              <a:rPr lang="en"/>
+              <a:t>nvm install-latest-npm</a:t>
             </a:r>
             <a:endParaRPr/>
           </a:p>
@@ -7976,7 +8563,7 @@
       </p:sp>
       <p:sp>
         <p:nvSpPr>
-          <p:cNvPr id="66" name="Google Shape;66;p12"/>
+          <p:cNvPr id="81" name="Google Shape;81;p12"/>
           <p:cNvSpPr txBox="1"/>
           <p:nvPr>
             <p:ph idx="12" type="sldNum"/>
@@ -7984,8 +8571,8 @@
         </p:nvSpPr>
         <p:spPr>
           <a:xfrm>
-            <a:off x="7315209" y="4229101"/>
-            <a:ext cx="1828800" cy="914400"/>
+            <a:off x="7315202" y="4416550"/>
+            <a:ext cx="1828800" cy="731400"/>
           </a:xfrm>
           <a:prstGeom prst="rect">
             <a:avLst/>
@@ -8020,23 +8607,30 @@
               <a:spcAft>
                 <a:spcPts val="0"/>
               </a:spcAft>
-              <a:buClr>
-                <a:schemeClr val="dk1"/>
-              </a:buClr>
-              <a:buSzPts val="1100"/>
-              <a:buFont typeface="Arial"/>
-              <a:buNone/>
-            </a:pPr>
-            <a:r>
-              <a:rPr b="0" lang="en" sz="1000" u="sng">
+              <a:buNone/>
+            </a:pPr>
+            <a:r>
+              <a:rPr b="0" lang="en" sz="900" u="sng">
                 <a:solidFill>
                   <a:schemeClr val="hlink"/>
                 </a:solidFill>
                 <a:hlinkClick r:id="rId4"/>
               </a:rPr>
-              <a:t>https://profriehle.com</a:t>
-            </a:r>
-            <a:endParaRPr b="0" sz="1000"/>
+              <a:t>https://oss.cs.fau.de</a:t>
+            </a:r>
+            <a:r>
+              <a:rPr b="0" lang="en" sz="900">
+                <a:solidFill>
+                  <a:schemeClr val="dk2"/>
+                </a:solidFill>
+              </a:rPr>
+              <a:t> </a:t>
+            </a:r>
+            <a:endParaRPr b="0" sz="900">
+              <a:solidFill>
+                <a:schemeClr val="dk2"/>
+              </a:solidFill>
+            </a:endParaRPr>
           </a:p>
         </p:txBody>
       </p:sp>
@@ -8053,7 +8647,7 @@
   <p:cSld>
     <p:spTree>
       <p:nvGrpSpPr>
-        <p:cNvPr id="70" name="Shape 70"/>
+        <p:cNvPr id="85" name="Shape 85"/>
         <p:cNvGrpSpPr/>
         <p:nvPr/>
       </p:nvGrpSpPr>
@@ -8067,7 +8661,7 @@
       </p:grpSpPr>
       <p:sp>
         <p:nvSpPr>
-          <p:cNvPr id="71" name="Google Shape;71;p13"/>
+          <p:cNvPr id="86" name="Google Shape;86;p13"/>
           <p:cNvSpPr txBox="1"/>
           <p:nvPr>
             <p:ph type="title"/>
@@ -8107,7 +8701,7 @@
       </p:sp>
       <p:sp>
         <p:nvSpPr>
-          <p:cNvPr id="72" name="Google Shape;72;p13"/>
+          <p:cNvPr id="87" name="Google Shape;87;p13"/>
           <p:cNvSpPr txBox="1"/>
           <p:nvPr>
             <p:ph idx="1" type="body"/>
@@ -8205,7 +8799,7 @@
       </p:sp>
       <p:sp>
         <p:nvSpPr>
-          <p:cNvPr id="73" name="Google Shape;73;p13"/>
+          <p:cNvPr id="88" name="Google Shape;88;p13"/>
           <p:cNvSpPr txBox="1"/>
           <p:nvPr>
             <p:ph idx="12" type="sldNum"/>
@@ -8213,8 +8807,8 @@
         </p:nvSpPr>
         <p:spPr>
           <a:xfrm>
-            <a:off x="7315209" y="4229101"/>
-            <a:ext cx="1828800" cy="914400"/>
+            <a:off x="7315202" y="4416550"/>
+            <a:ext cx="1828800" cy="731400"/>
           </a:xfrm>
           <a:prstGeom prst="rect">
             <a:avLst/>
@@ -8249,23 +8843,30 @@
               <a:spcAft>
                 <a:spcPts val="0"/>
               </a:spcAft>
-              <a:buClr>
-                <a:schemeClr val="dk1"/>
-              </a:buClr>
-              <a:buSzPts val="1100"/>
-              <a:buFont typeface="Arial"/>
-              <a:buNone/>
-            </a:pPr>
-            <a:r>
-              <a:rPr b="0" lang="en" sz="1000" u="sng">
+              <a:buNone/>
+            </a:pPr>
+            <a:r>
+              <a:rPr b="0" lang="en" sz="900" u="sng">
                 <a:solidFill>
                   <a:schemeClr val="hlink"/>
                 </a:solidFill>
                 <a:hlinkClick r:id="rId3"/>
               </a:rPr>
-              <a:t>https://profriehle.com</a:t>
-            </a:r>
-            <a:endParaRPr b="0" sz="1000"/>
+              <a:t>https://oss.cs.fau.de</a:t>
+            </a:r>
+            <a:r>
+              <a:rPr b="0" lang="en" sz="900">
+                <a:solidFill>
+                  <a:schemeClr val="dk2"/>
+                </a:solidFill>
+              </a:rPr>
+              <a:t> </a:t>
+            </a:r>
+            <a:endParaRPr b="0" sz="900">
+              <a:solidFill>
+                <a:schemeClr val="dk2"/>
+              </a:solidFill>
+            </a:endParaRPr>
           </a:p>
         </p:txBody>
       </p:sp>
@@ -8282,7 +8883,7 @@
   <p:cSld>
     <p:spTree>
       <p:nvGrpSpPr>
-        <p:cNvPr id="77" name="Shape 77"/>
+        <p:cNvPr id="92" name="Shape 92"/>
         <p:cNvGrpSpPr/>
         <p:nvPr/>
       </p:nvGrpSpPr>
@@ -8296,7 +8897,7 @@
       </p:grpSpPr>
       <p:sp>
         <p:nvSpPr>
-          <p:cNvPr id="78" name="Google Shape;78;p14"/>
+          <p:cNvPr id="93" name="Google Shape;93;p14"/>
           <p:cNvSpPr txBox="1"/>
           <p:nvPr>
             <p:ph type="title"/>
@@ -8324,11 +8925,16 @@
               <a:spcAft>
                 <a:spcPts val="0"/>
               </a:spcAft>
-              <a:buNone/>
-            </a:pPr>
-            <a:r>
-              <a:rPr lang="en"/>
-              <a:t>Typescript</a:t>
+              <a:buClr>
+                <a:schemeClr val="dk1"/>
+              </a:buClr>
+              <a:buSzPts val="1100"/>
+              <a:buFont typeface="Arial"/>
+              <a:buNone/>
+            </a:pPr>
+            <a:r>
+              <a:rPr lang="en"/>
+              <a:t>ADAP Examples and Homework</a:t>
             </a:r>
             <a:endParaRPr/>
           </a:p>
@@ -8336,7 +8942,7 @@
       </p:sp>
       <p:sp>
         <p:nvSpPr>
-          <p:cNvPr id="79" name="Google Shape;79;p14"/>
+          <p:cNvPr id="94" name="Google Shape;94;p14"/>
           <p:cNvSpPr txBox="1"/>
           <p:nvPr>
             <p:ph idx="1" type="body"/>
@@ -8368,7 +8974,7 @@
             </a:pPr>
             <a:r>
               <a:rPr lang="en"/>
-              <a:t>Typescript is</a:t>
+              <a:t>riehlegroup/adap-names contains</a:t>
             </a:r>
             <a:endParaRPr/>
           </a:p>
@@ -8385,7 +8991,7 @@
             </a:pPr>
             <a:r>
               <a:rPr lang="en"/>
-              <a:t>A more type-safe Javascript</a:t>
+              <a:t>Our running example code; use as you see fit</a:t>
             </a:r>
             <a:endParaRPr/>
           </a:p>
@@ -8423,7 +9029,7 @@
                 </a:solidFill>
                 <a:hlinkClick r:id="rId3"/>
               </a:rPr>
-              <a:t>https://www.typescriptlang.org/download/</a:t>
+              <a:t>https://github.com/riehlegroup/adap-names</a:t>
             </a:r>
             <a:r>
               <a:rPr lang="en"/>
@@ -8432,9 +9038,25 @@
             <a:endParaRPr/>
           </a:p>
           <a:p>
+            <a:pPr indent="0" lvl="0" marL="0" rtl="0" algn="l">
+              <a:spcBef>
+                <a:spcPts val="1200"/>
+              </a:spcBef>
+              <a:spcAft>
+                <a:spcPts val="0"/>
+              </a:spcAft>
+              <a:buNone/>
+            </a:pPr>
+            <a:r>
+              <a:rPr lang="en"/>
+              <a:t>Example</a:t>
+            </a:r>
+            <a:endParaRPr/>
+          </a:p>
+          <a:p>
             <a:pPr indent="-342900" lvl="0" marL="457200" rtl="0" algn="l">
               <a:spcBef>
-                <a:spcPts val="0"/>
+                <a:spcPts val="1200"/>
               </a:spcBef>
               <a:spcAft>
                 <a:spcPts val="0"/>
@@ -8444,30 +9066,14 @@
             </a:pPr>
             <a:r>
               <a:rPr lang="en"/>
-              <a:t>Through npm</a:t>
-            </a:r>
-            <a:endParaRPr/>
-          </a:p>
-          <a:p>
-            <a:pPr indent="0" lvl="0" marL="0" rtl="0" algn="l">
-              <a:spcBef>
-                <a:spcPts val="1200"/>
-              </a:spcBef>
-              <a:spcAft>
-                <a:spcPts val="0"/>
-              </a:spcAft>
-              <a:buNone/>
-            </a:pPr>
-            <a:r>
-              <a:rPr lang="en"/>
-              <a:t>Example</a:t>
+              <a:t>Fork the repository on GitHub # using example user friedalexuni</a:t>
             </a:r>
             <a:endParaRPr/>
           </a:p>
           <a:p>
             <a:pPr indent="-342900" lvl="0" marL="457200" rtl="0" algn="l">
               <a:spcBef>
-                <a:spcPts val="1200"/>
+                <a:spcPts val="0"/>
               </a:spcBef>
               <a:spcAft>
                 <a:spcPts val="0"/>
@@ -8477,11 +9083,20 @@
             </a:pPr>
             <a:r>
               <a:rPr lang="en"/>
-              <a:t>npm install typescript </a:t>
-            </a:r>
-            <a:r>
-              <a:rPr lang="en"/>
-              <a:t>--save-dev # local install</a:t>
+              <a:t>git clone </a:t>
+            </a:r>
+            <a:r>
+              <a:rPr lang="en" u="sng">
+                <a:solidFill>
+                  <a:schemeClr val="hlink"/>
+                </a:solidFill>
+                <a:hlinkClick r:id="rId4"/>
+              </a:rPr>
+              <a:t>https://github.com/friedalexuni/adap-names</a:t>
+            </a:r>
+            <a:r>
+              <a:rPr lang="en"/>
+              <a:t> </a:t>
             </a:r>
             <a:endParaRPr/>
           </a:p>
@@ -8498,7 +9113,41 @@
             </a:pPr>
             <a:r>
               <a:rPr lang="en"/>
-              <a:t>npm install @types/node --save-dev # install types</a:t>
+              <a:t>npm install # installs project dependencies</a:t>
+            </a:r>
+            <a:endParaRPr/>
+          </a:p>
+          <a:p>
+            <a:pPr indent="-342900" lvl="0" marL="457200" rtl="0" algn="l">
+              <a:spcBef>
+                <a:spcPts val="0"/>
+              </a:spcBef>
+              <a:spcAft>
+                <a:spcPts val="0"/>
+              </a:spcAft>
+              <a:buSzPts val="1800"/>
+              <a:buChar char="●"/>
+            </a:pPr>
+            <a:r>
+              <a:rPr lang="en"/>
+              <a:t>npm run build # compiles and builds</a:t>
+            </a:r>
+            <a:endParaRPr/>
+          </a:p>
+          <a:p>
+            <a:pPr indent="-342900" lvl="0" marL="457200" rtl="0" algn="l">
+              <a:spcBef>
+                <a:spcPts val="0"/>
+              </a:spcBef>
+              <a:spcAft>
+                <a:spcPts val="0"/>
+              </a:spcAft>
+              <a:buSzPts val="1800"/>
+              <a:buChar char="●"/>
+            </a:pPr>
+            <a:r>
+              <a:rPr lang="en"/>
+              <a:t>npm run test # runs tests</a:t>
             </a:r>
             <a:endParaRPr/>
           </a:p>
@@ -8521,7 +9170,7 @@
       </p:sp>
       <p:sp>
         <p:nvSpPr>
-          <p:cNvPr id="80" name="Google Shape;80;p14"/>
+          <p:cNvPr id="95" name="Google Shape;95;p14"/>
           <p:cNvSpPr txBox="1"/>
           <p:nvPr>
             <p:ph idx="12" type="sldNum"/>
@@ -8529,8 +9178,8 @@
         </p:nvSpPr>
         <p:spPr>
           <a:xfrm>
-            <a:off x="7315209" y="4229101"/>
-            <a:ext cx="1828800" cy="914400"/>
+            <a:off x="7315202" y="4416550"/>
+            <a:ext cx="1828800" cy="731400"/>
           </a:xfrm>
           <a:prstGeom prst="rect">
             <a:avLst/>
@@ -8565,23 +9214,30 @@
               <a:spcAft>
                 <a:spcPts val="0"/>
               </a:spcAft>
-              <a:buClr>
-                <a:schemeClr val="dk1"/>
-              </a:buClr>
-              <a:buSzPts val="1100"/>
-              <a:buFont typeface="Arial"/>
-              <a:buNone/>
-            </a:pPr>
-            <a:r>
-              <a:rPr b="0" lang="en" sz="1000" u="sng">
+              <a:buNone/>
+            </a:pPr>
+            <a:r>
+              <a:rPr b="0" lang="en" sz="900" u="sng">
                 <a:solidFill>
                   <a:schemeClr val="hlink"/>
                 </a:solidFill>
-                <a:hlinkClick r:id="rId4"/>
+                <a:hlinkClick r:id="rId5"/>
               </a:rPr>
-              <a:t>https://profriehle.com</a:t>
-            </a:r>
-            <a:endParaRPr b="0" sz="1000"/>
+              <a:t>https://oss.cs.fau.de</a:t>
+            </a:r>
+            <a:r>
+              <a:rPr b="0" lang="en" sz="900">
+                <a:solidFill>
+                  <a:schemeClr val="dk2"/>
+                </a:solidFill>
+              </a:rPr>
+              <a:t> </a:t>
+            </a:r>
+            <a:endParaRPr b="0" sz="900">
+              <a:solidFill>
+                <a:schemeClr val="dk2"/>
+              </a:solidFill>
+            </a:endParaRPr>
           </a:p>
         </p:txBody>
       </p:sp>
@@ -8598,7 +9254,7 @@
   <p:cSld>
     <p:spTree>
       <p:nvGrpSpPr>
-        <p:cNvPr id="84" name="Shape 84"/>
+        <p:cNvPr id="99" name="Shape 99"/>
         <p:cNvGrpSpPr/>
         <p:nvPr/>
       </p:nvGrpSpPr>
@@ -8612,7 +9268,7 @@
       </p:grpSpPr>
       <p:sp>
         <p:nvSpPr>
-          <p:cNvPr id="85" name="Google Shape;85;p15"/>
+          <p:cNvPr id="100" name="Google Shape;100;p15"/>
           <p:cNvSpPr txBox="1"/>
           <p:nvPr>
             <p:ph type="title"/>
@@ -8640,16 +9296,11 @@
               <a:spcAft>
                 <a:spcPts val="0"/>
               </a:spcAft>
-              <a:buClr>
-                <a:schemeClr val="dk1"/>
-              </a:buClr>
-              <a:buSzPts val="1100"/>
-              <a:buFont typeface="Arial"/>
-              <a:buNone/>
-            </a:pPr>
-            <a:r>
-              <a:rPr lang="en"/>
-              <a:t>ADAP Examples and Homework</a:t>
+              <a:buNone/>
+            </a:pPr>
+            <a:r>
+              <a:rPr lang="en"/>
+              <a:t>Typescript</a:t>
             </a:r>
             <a:endParaRPr/>
           </a:p>
@@ -8657,7 +9308,7 @@
       </p:sp>
       <p:sp>
         <p:nvSpPr>
-          <p:cNvPr id="86" name="Google Shape;86;p15"/>
+          <p:cNvPr id="101" name="Google Shape;101;p15"/>
           <p:cNvSpPr txBox="1"/>
           <p:nvPr>
             <p:ph idx="1" type="body"/>
@@ -8689,7 +9340,7 @@
             </a:pPr>
             <a:r>
               <a:rPr lang="en"/>
-              <a:t>riehlegroup/adap-names contains</a:t>
+              <a:t>Typescript is</a:t>
             </a:r>
             <a:endParaRPr/>
           </a:p>
@@ -8706,7 +9357,7 @@
             </a:pPr>
             <a:r>
               <a:rPr lang="en"/>
-              <a:t>Our running example code; use as you see fit</a:t>
+              <a:t>A more type-safe Javascript</a:t>
             </a:r>
             <a:endParaRPr/>
           </a:p>
@@ -8744,7 +9395,7 @@
                 </a:solidFill>
                 <a:hlinkClick r:id="rId3"/>
               </a:rPr>
-              <a:t>https://github.com/riehlegroup/adap-names</a:t>
+              <a:t>https://www.typescriptlang.org/download/</a:t>
             </a:r>
             <a:r>
               <a:rPr lang="en"/>
@@ -8753,25 +9404,9 @@
             <a:endParaRPr/>
           </a:p>
           <a:p>
-            <a:pPr indent="0" lvl="0" marL="0" rtl="0" algn="l">
-              <a:spcBef>
-                <a:spcPts val="1200"/>
-              </a:spcBef>
-              <a:spcAft>
-                <a:spcPts val="0"/>
-              </a:spcAft>
-              <a:buNone/>
-            </a:pPr>
-            <a:r>
-              <a:rPr lang="en"/>
-              <a:t>Example</a:t>
-            </a:r>
-            <a:endParaRPr/>
-          </a:p>
-          <a:p>
             <a:pPr indent="-342900" lvl="0" marL="457200" rtl="0" algn="l">
               <a:spcBef>
-                <a:spcPts val="1200"/>
+                <a:spcPts val="0"/>
               </a:spcBef>
               <a:spcAft>
                 <a:spcPts val="0"/>
@@ -8781,14 +9416,30 @@
             </a:pPr>
             <a:r>
               <a:rPr lang="en"/>
-              <a:t>Fork the repository on GitHub # using example user friedalexuni</a:t>
+              <a:t>Through npm</a:t>
+            </a:r>
+            <a:endParaRPr/>
+          </a:p>
+          <a:p>
+            <a:pPr indent="0" lvl="0" marL="0" rtl="0" algn="l">
+              <a:spcBef>
+                <a:spcPts val="1200"/>
+              </a:spcBef>
+              <a:spcAft>
+                <a:spcPts val="0"/>
+              </a:spcAft>
+              <a:buNone/>
+            </a:pPr>
+            <a:r>
+              <a:rPr lang="en"/>
+              <a:t>Example (if not present in package.json)</a:t>
             </a:r>
             <a:endParaRPr/>
           </a:p>
           <a:p>
             <a:pPr indent="-342900" lvl="0" marL="457200" rtl="0" algn="l">
               <a:spcBef>
-                <a:spcPts val="0"/>
+                <a:spcPts val="1200"/>
               </a:spcBef>
               <a:spcAft>
                 <a:spcPts val="0"/>
@@ -8798,20 +9449,11 @@
             </a:pPr>
             <a:r>
               <a:rPr lang="en"/>
-              <a:t>git clone </a:t>
-            </a:r>
-            <a:r>
-              <a:rPr lang="en" u="sng">
-                <a:solidFill>
-                  <a:schemeClr val="hlink"/>
-                </a:solidFill>
-                <a:hlinkClick r:id="rId4"/>
-              </a:rPr>
-              <a:t>https://github.com/friedalexuni/adap-names</a:t>
-            </a:r>
-            <a:r>
-              <a:rPr lang="en"/>
-              <a:t> </a:t>
+              <a:t>npm install typescript </a:t>
+            </a:r>
+            <a:r>
+              <a:rPr lang="en"/>
+              <a:t>--save-dev # local install</a:t>
             </a:r>
             <a:endParaRPr/>
           </a:p>
@@ -8828,41 +9470,7 @@
             </a:pPr>
             <a:r>
               <a:rPr lang="en"/>
-              <a:t>npm install # installs project dependencies</a:t>
-            </a:r>
-            <a:endParaRPr/>
-          </a:p>
-          <a:p>
-            <a:pPr indent="-342900" lvl="0" marL="457200" rtl="0" algn="l">
-              <a:spcBef>
-                <a:spcPts val="0"/>
-              </a:spcBef>
-              <a:spcAft>
-                <a:spcPts val="0"/>
-              </a:spcAft>
-              <a:buSzPts val="1800"/>
-              <a:buChar char="●"/>
-            </a:pPr>
-            <a:r>
-              <a:rPr lang="en"/>
-              <a:t>npm run build # compiles and builds</a:t>
-            </a:r>
-            <a:endParaRPr/>
-          </a:p>
-          <a:p>
-            <a:pPr indent="-342900" lvl="0" marL="457200" rtl="0" algn="l">
-              <a:spcBef>
-                <a:spcPts val="0"/>
-              </a:spcBef>
-              <a:spcAft>
-                <a:spcPts val="0"/>
-              </a:spcAft>
-              <a:buSzPts val="1800"/>
-              <a:buChar char="●"/>
-            </a:pPr>
-            <a:r>
-              <a:rPr lang="en"/>
-              <a:t>npm run test # runs tests</a:t>
+              <a:t>npm install @types/node --save-dev # install types</a:t>
             </a:r>
             <a:endParaRPr/>
           </a:p>
@@ -8885,7 +9493,7 @@
       </p:sp>
       <p:sp>
         <p:nvSpPr>
-          <p:cNvPr id="87" name="Google Shape;87;p15"/>
+          <p:cNvPr id="102" name="Google Shape;102;p15"/>
           <p:cNvSpPr txBox="1"/>
           <p:nvPr>
             <p:ph idx="12" type="sldNum"/>
@@ -8893,8 +9501,8 @@
         </p:nvSpPr>
         <p:spPr>
           <a:xfrm>
-            <a:off x="7315209" y="4229101"/>
-            <a:ext cx="1828800" cy="914400"/>
+            <a:off x="7315202" y="4416550"/>
+            <a:ext cx="1828800" cy="731400"/>
           </a:xfrm>
           <a:prstGeom prst="rect">
             <a:avLst/>
@@ -8929,23 +9537,30 @@
               <a:spcAft>
                 <a:spcPts val="0"/>
               </a:spcAft>
-              <a:buClr>
-                <a:schemeClr val="dk1"/>
-              </a:buClr>
-              <a:buSzPts val="1100"/>
-              <a:buFont typeface="Arial"/>
-              <a:buNone/>
-            </a:pPr>
-            <a:r>
-              <a:rPr b="0" lang="en" sz="1000" u="sng">
+              <a:buNone/>
+            </a:pPr>
+            <a:r>
+              <a:rPr b="0" lang="en" sz="900" u="sng">
                 <a:solidFill>
                   <a:schemeClr val="hlink"/>
                 </a:solidFill>
-                <a:hlinkClick r:id="rId5"/>
+                <a:hlinkClick r:id="rId4"/>
               </a:rPr>
-              <a:t>https://profriehle.com</a:t>
-            </a:r>
-            <a:endParaRPr b="0" sz="1000"/>
+              <a:t>https://oss.cs.fau.de</a:t>
+            </a:r>
+            <a:r>
+              <a:rPr b="0" lang="en" sz="900">
+                <a:solidFill>
+                  <a:schemeClr val="dk2"/>
+                </a:solidFill>
+              </a:rPr>
+              <a:t> </a:t>
+            </a:r>
+            <a:endParaRPr b="0" sz="900">
+              <a:solidFill>
+                <a:schemeClr val="dk2"/>
+              </a:solidFill>
+            </a:endParaRPr>
           </a:p>
         </p:txBody>
       </p:sp>
@@ -8962,7 +9577,7 @@
   <p:cSld>
     <p:spTree>
       <p:nvGrpSpPr>
-        <p:cNvPr id="91" name="Shape 91"/>
+        <p:cNvPr id="106" name="Shape 106"/>
         <p:cNvGrpSpPr/>
         <p:nvPr/>
       </p:nvGrpSpPr>
@@ -8976,7 +9591,7 @@
       </p:grpSpPr>
       <p:sp>
         <p:nvSpPr>
-          <p:cNvPr id="92" name="Google Shape;92;p16"/>
+          <p:cNvPr id="107" name="Google Shape;107;p16"/>
           <p:cNvSpPr txBox="1"/>
           <p:nvPr>
             <p:ph type="title"/>
@@ -9016,7 +9631,7 @@
       </p:sp>
       <p:sp>
         <p:nvSpPr>
-          <p:cNvPr id="93" name="Google Shape;93;p16"/>
+          <p:cNvPr id="108" name="Google Shape;108;p16"/>
           <p:cNvSpPr txBox="1"/>
           <p:nvPr>
             <p:ph idx="1" type="body"/>
@@ -9238,7 +9853,7 @@
       </p:sp>
       <p:sp>
         <p:nvSpPr>
-          <p:cNvPr id="94" name="Google Shape;94;p16"/>
+          <p:cNvPr id="109" name="Google Shape;109;p16"/>
           <p:cNvSpPr txBox="1"/>
           <p:nvPr>
             <p:ph idx="12" type="sldNum"/>
@@ -9246,8 +9861,8 @@
         </p:nvSpPr>
         <p:spPr>
           <a:xfrm>
-            <a:off x="7315209" y="4229101"/>
-            <a:ext cx="1828800" cy="914400"/>
+            <a:off x="7315202" y="4416550"/>
+            <a:ext cx="1828800" cy="731400"/>
           </a:xfrm>
           <a:prstGeom prst="rect">
             <a:avLst/>
@@ -9282,23 +9897,30 @@
               <a:spcAft>
                 <a:spcPts val="0"/>
               </a:spcAft>
-              <a:buClr>
-                <a:schemeClr val="dk1"/>
-              </a:buClr>
-              <a:buSzPts val="1100"/>
-              <a:buFont typeface="Arial"/>
-              <a:buNone/>
-            </a:pPr>
-            <a:r>
-              <a:rPr b="0" lang="en" sz="1000" u="sng">
+              <a:buNone/>
+            </a:pPr>
+            <a:r>
+              <a:rPr b="0" lang="en" sz="900" u="sng">
                 <a:solidFill>
                   <a:schemeClr val="hlink"/>
                 </a:solidFill>
                 <a:hlinkClick r:id="rId5"/>
               </a:rPr>
-              <a:t>https://profriehle.com</a:t>
-            </a:r>
-            <a:endParaRPr b="0" sz="1000"/>
+              <a:t>https://oss.cs.fau.de</a:t>
+            </a:r>
+            <a:r>
+              <a:rPr b="0" lang="en" sz="900">
+                <a:solidFill>
+                  <a:schemeClr val="dk2"/>
+                </a:solidFill>
+              </a:rPr>
+              <a:t> </a:t>
+            </a:r>
+            <a:endParaRPr b="0" sz="900">
+              <a:solidFill>
+                <a:schemeClr val="dk2"/>
+              </a:solidFill>
+            </a:endParaRPr>
           </a:p>
         </p:txBody>
       </p:sp>
@@ -9590,7 +10212,7 @@
 </file>
 
 <file path=ppt/theme/theme2.xml><?xml version="1.0" encoding="utf-8"?>
-<a:theme xmlns:a="http://schemas.openxmlformats.org/drawingml/2006/main" xmlns:r="http://schemas.openxmlformats.org/officeDocument/2006/relationships" name="ADAP Slides Template">
+<a:theme xmlns:a="http://schemas.openxmlformats.org/drawingml/2006/main" xmlns:r="http://schemas.openxmlformats.org/officeDocument/2006/relationships" name="POSS Slides Template">
   <a:themeElements>
     <a:clrScheme name="Simple Light">
       <a:dk1>
@@ -9612,19 +10234,19 @@
         <a:srgbClr val="4169E1"/>
       </a:accent2>
       <a:accent3>
-        <a:srgbClr val="D50D01"/>
+        <a:srgbClr val="4CAF50"/>
       </a:accent3>
       <a:accent4>
         <a:srgbClr val="FEB612"/>
       </a:accent4>
       <a:accent5>
-        <a:srgbClr val="4CAF50"/>
+        <a:srgbClr val="F36838"/>
       </a:accent5>
       <a:accent6>
         <a:srgbClr val="8E44AD"/>
       </a:accent6>
       <a:hlink>
-        <a:srgbClr val="34A3C5"/>
+        <a:srgbClr val="1E90FF"/>
       </a:hlink>
       <a:folHlink>
         <a:srgbClr val="0097A7"/>

</xml_diff>

<commit_message>
After programming section, preparing for design section
</commit_message>
<xml_diff>
--- a/Lecture slides/ADAP A02 - Programming Setup.pptx
+++ b/Lecture slides/ADAP A02 - Programming Setup.pptx
@@ -9007,7 +9007,7 @@
             </a:pPr>
             <a:r>
               <a:rPr lang="en"/>
-              <a:t>Installation</a:t>
+              <a:t>First fork on GitHub</a:t>
             </a:r>
             <a:endParaRPr/>
           </a:p>
@@ -9031,10 +9031,6 @@
               </a:rPr>
               <a:t>https://github.com/riehlegroup/adap-names</a:t>
             </a:r>
-            <a:r>
-              <a:rPr lang="en"/>
-              <a:t> </a:t>
-            </a:r>
             <a:endParaRPr/>
           </a:p>
           <a:p>
@@ -9049,7 +9045,7 @@
             </a:pPr>
             <a:r>
               <a:rPr lang="en"/>
-              <a:t>Example</a:t>
+              <a:t>Then clone to your work machine</a:t>
             </a:r>
             <a:endParaRPr/>
           </a:p>
@@ -9066,37 +9062,7 @@
             </a:pPr>
             <a:r>
               <a:rPr lang="en"/>
-              <a:t>Fork the repository on GitHub # using example user friedalexuni</a:t>
-            </a:r>
-            <a:endParaRPr/>
-          </a:p>
-          <a:p>
-            <a:pPr indent="-342900" lvl="0" marL="457200" rtl="0" algn="l">
-              <a:spcBef>
-                <a:spcPts val="0"/>
-              </a:spcBef>
-              <a:spcAft>
-                <a:spcPts val="0"/>
-              </a:spcAft>
-              <a:buSzPts val="1800"/>
-              <a:buChar char="●"/>
-            </a:pPr>
-            <a:r>
-              <a:rPr lang="en"/>
-              <a:t>git clone </a:t>
-            </a:r>
-            <a:r>
-              <a:rPr lang="en" u="sng">
-                <a:solidFill>
-                  <a:schemeClr val="hlink"/>
-                </a:solidFill>
-                <a:hlinkClick r:id="rId4"/>
-              </a:rPr>
-              <a:t>https://github.com/friedalexuni/adap-names</a:t>
-            </a:r>
-            <a:r>
-              <a:rPr lang="en"/>
-              <a:t> </a:t>
+              <a:t>git clone https://github.com/friedalex/adap-names.git </a:t>
             </a:r>
             <a:endParaRPr/>
           </a:p>
@@ -9221,7 +9187,7 @@
                 <a:solidFill>
                   <a:schemeClr val="hlink"/>
                 </a:solidFill>
-                <a:hlinkClick r:id="rId5"/>
+                <a:hlinkClick r:id="rId4"/>
               </a:rPr>
               <a:t>https://oss.cs.fau.de</a:t>
             </a:r>

</xml_diff>